<commit_message>
gitIgnore on the base path. remove .vs files
</commit_message>
<xml_diff>
--- a/ORM.pptx
+++ b/ORM.pptx
@@ -6,7 +6,7 @@
     <p:sldMasterId id="2147483659" r:id="rId2"/>
   </p:sldMasterIdLst>
   <p:notesMasterIdLst>
-    <p:notesMasterId r:id="rId12"/>
+    <p:notesMasterId r:id="rId15"/>
   </p:notesMasterIdLst>
   <p:sldIdLst>
     <p:sldId id="257" r:id="rId3"/>
@@ -17,7 +17,10 @@
     <p:sldId id="653" r:id="rId8"/>
     <p:sldId id="654" r:id="rId9"/>
     <p:sldId id="655" r:id="rId10"/>
-    <p:sldId id="656" r:id="rId11"/>
+    <p:sldId id="657" r:id="rId11"/>
+    <p:sldId id="658" r:id="rId12"/>
+    <p:sldId id="659" r:id="rId13"/>
+    <p:sldId id="656" r:id="rId14"/>
   </p:sldIdLst>
   <p:sldSz cx="12192000" cy="6858000"/>
   <p:notesSz cx="6858000" cy="9144000"/>
@@ -217,7 +220,7 @@
           <a:p>
             <a:fld id="{9F002C11-C09A-4ACE-9D7A-CCD5AA8B4878}" type="datetimeFigureOut">
               <a:rPr lang="en-US" smtClean="0"/>
-              <a:t>2023-07-15</a:t>
+              <a:t>2023-07-21</a:t>
             </a:fld>
             <a:endParaRPr lang="en-US"/>
           </a:p>
@@ -771,7 +774,7 @@
           <a:p>
             <a:fld id="{64BE20FA-FA32-4756-B1EB-057B8A95DD2C}" type="slidenum">
               <a:rPr lang="en-US" smtClean="0"/>
-              <a:t>9</a:t>
+              <a:t>12</a:t>
             </a:fld>
             <a:endParaRPr lang="en-US"/>
           </a:p>
@@ -917,7 +920,7 @@
           <a:p>
             <a:fld id="{BF8FF73C-A8CE-4A81-8069-D9219E5A7BF7}" type="datetimeFigureOut">
               <a:rPr lang="en-GB" smtClean="0"/>
-              <a:t>15/07/2023</a:t>
+              <a:t>21/07/2023</a:t>
             </a:fld>
             <a:endParaRPr lang="en-GB"/>
           </a:p>
@@ -1230,7 +1233,7 @@
           <a:p>
             <a:fld id="{BF8FF73C-A8CE-4A81-8069-D9219E5A7BF7}" type="datetimeFigureOut">
               <a:rPr lang="en-GB" smtClean="0"/>
-              <a:t>15/07/2023</a:t>
+              <a:t>21/07/2023</a:t>
             </a:fld>
             <a:endParaRPr lang="en-GB"/>
           </a:p>
@@ -1519,7 +1522,7 @@
           <a:p>
             <a:fld id="{BF8FF73C-A8CE-4A81-8069-D9219E5A7BF7}" type="datetimeFigureOut">
               <a:rPr lang="en-GB" smtClean="0"/>
-              <a:t>15/07/2023</a:t>
+              <a:t>21/07/2023</a:t>
             </a:fld>
             <a:endParaRPr lang="en-GB"/>
           </a:p>
@@ -1719,7 +1722,7 @@
           <a:p>
             <a:fld id="{BF8FF73C-A8CE-4A81-8069-D9219E5A7BF7}" type="datetimeFigureOut">
               <a:rPr lang="en-GB" smtClean="0"/>
-              <a:t>15/07/2023</a:t>
+              <a:t>21/07/2023</a:t>
             </a:fld>
             <a:endParaRPr lang="en-GB"/>
           </a:p>
@@ -1929,7 +1932,7 @@
           <a:p>
             <a:fld id="{BF8FF73C-A8CE-4A81-8069-D9219E5A7BF7}" type="datetimeFigureOut">
               <a:rPr lang="en-GB" smtClean="0"/>
-              <a:t>15/07/2023</a:t>
+              <a:t>21/07/2023</a:t>
             </a:fld>
             <a:endParaRPr lang="en-GB"/>
           </a:p>
@@ -2588,7 +2591,7 @@
           <a:p>
             <a:fld id="{BF8FF73C-A8CE-4A81-8069-D9219E5A7BF7}" type="datetimeFigureOut">
               <a:rPr lang="en-GB" smtClean="0"/>
-              <a:t>15/07/2023</a:t>
+              <a:t>21/07/2023</a:t>
             </a:fld>
             <a:endParaRPr lang="en-GB"/>
           </a:p>
@@ -2788,7 +2791,7 @@
           <a:p>
             <a:fld id="{BF8FF73C-A8CE-4A81-8069-D9219E5A7BF7}" type="datetimeFigureOut">
               <a:rPr lang="en-GB" smtClean="0"/>
-              <a:t>15/07/2023</a:t>
+              <a:t>21/07/2023</a:t>
             </a:fld>
             <a:endParaRPr lang="en-GB"/>
           </a:p>
@@ -3064,7 +3067,7 @@
           <a:p>
             <a:fld id="{BF8FF73C-A8CE-4A81-8069-D9219E5A7BF7}" type="datetimeFigureOut">
               <a:rPr lang="en-GB" smtClean="0"/>
-              <a:t>15/07/2023</a:t>
+              <a:t>21/07/2023</a:t>
             </a:fld>
             <a:endParaRPr lang="en-GB"/>
           </a:p>
@@ -3332,7 +3335,7 @@
           <a:p>
             <a:fld id="{BF8FF73C-A8CE-4A81-8069-D9219E5A7BF7}" type="datetimeFigureOut">
               <a:rPr lang="en-GB" smtClean="0"/>
-              <a:t>15/07/2023</a:t>
+              <a:t>21/07/2023</a:t>
             </a:fld>
             <a:endParaRPr lang="en-GB"/>
           </a:p>
@@ -3747,7 +3750,7 @@
           <a:p>
             <a:fld id="{BF8FF73C-A8CE-4A81-8069-D9219E5A7BF7}" type="datetimeFigureOut">
               <a:rPr lang="en-GB" smtClean="0"/>
-              <a:t>15/07/2023</a:t>
+              <a:t>21/07/2023</a:t>
             </a:fld>
             <a:endParaRPr lang="en-GB"/>
           </a:p>
@@ -3889,7 +3892,7 @@
           <a:p>
             <a:fld id="{BF8FF73C-A8CE-4A81-8069-D9219E5A7BF7}" type="datetimeFigureOut">
               <a:rPr lang="en-GB" smtClean="0"/>
-              <a:t>15/07/2023</a:t>
+              <a:t>21/07/2023</a:t>
             </a:fld>
             <a:endParaRPr lang="en-GB"/>
           </a:p>
@@ -4130,7 +4133,7 @@
           <a:p>
             <a:fld id="{C12C188B-3DDD-4AB5-80E3-A20B86A22CA2}" type="datetimeFigureOut">
               <a:rPr lang="en-US" smtClean="0"/>
-              <a:t>2023-07-15</a:t>
+              <a:t>2023-07-21</a:t>
             </a:fld>
             <a:endParaRPr lang="en-US"/>
           </a:p>
@@ -4789,7 +4792,7 @@
           <a:p>
             <a:fld id="{BF8FF73C-A8CE-4A81-8069-D9219E5A7BF7}" type="datetimeFigureOut">
               <a:rPr lang="en-GB" smtClean="0"/>
-              <a:t>15/07/2023</a:t>
+              <a:t>21/07/2023</a:t>
             </a:fld>
             <a:endParaRPr lang="en-GB"/>
           </a:p>
@@ -5515,6 +5518,1917 @@
     <p:extLst>
       <p:ext uri="{BB962C8B-B14F-4D97-AF65-F5344CB8AC3E}">
         <p14:creationId xmlns:p14="http://schemas.microsoft.com/office/powerpoint/2010/main" val="2289722737"/>
+      </p:ext>
+    </p:extLst>
+  </p:cSld>
+  <p:clrMapOvr>
+    <a:masterClrMapping/>
+  </p:clrMapOvr>
+  <mc:AlternateContent xmlns:mc="http://schemas.openxmlformats.org/markup-compatibility/2006" xmlns:p14="http://schemas.microsoft.com/office/powerpoint/2010/main">
+    <mc:Choice Requires="p14">
+      <p:transition spd="med" p14:dur="700">
+        <p:fade/>
+      </p:transition>
+    </mc:Choice>
+    <mc:Fallback xmlns="">
+      <p:transition spd="med">
+        <p:fade/>
+      </p:transition>
+    </mc:Fallback>
+  </mc:AlternateContent>
+</p:sld>
+</file>
+
+<file path=ppt/slides/slide10.xml><?xml version="1.0" encoding="utf-8"?>
+<p:sld xmlns:a="http://schemas.openxmlformats.org/drawingml/2006/main" xmlns:r="http://schemas.openxmlformats.org/officeDocument/2006/relationships" xmlns:p="http://schemas.openxmlformats.org/presentationml/2006/main">
+  <p:cSld>
+    <p:spTree>
+      <p:nvGrpSpPr>
+        <p:cNvPr id="1" name=""/>
+        <p:cNvGrpSpPr/>
+        <p:nvPr/>
+      </p:nvGrpSpPr>
+      <p:grpSpPr>
+        <a:xfrm>
+          <a:off x="0" y="0"/>
+          <a:ext cx="0" cy="0"/>
+          <a:chOff x="0" y="0"/>
+          <a:chExt cx="0" cy="0"/>
+        </a:xfrm>
+      </p:grpSpPr>
+      <p:sp>
+        <p:nvSpPr>
+          <p:cNvPr id="22" name="Rectangle 21">
+            <a:extLst>
+              <a:ext uri="{FF2B5EF4-FFF2-40B4-BE49-F238E27FC236}">
+                <a16:creationId xmlns:a16="http://schemas.microsoft.com/office/drawing/2014/main" id="{422D24B8-5366-4F60-8DB7-03104991E720}"/>
+              </a:ext>
+            </a:extLst>
+          </p:cNvPr>
+          <p:cNvSpPr/>
+          <p:nvPr/>
+        </p:nvSpPr>
+        <p:spPr>
+          <a:xfrm>
+            <a:off x="0" y="0"/>
+            <a:ext cx="12192000" cy="227974"/>
+          </a:xfrm>
+          <a:prstGeom prst="rect">
+            <a:avLst/>
+          </a:prstGeom>
+          <a:solidFill>
+            <a:schemeClr val="accent2"/>
+          </a:solidFill>
+          <a:ln>
+            <a:noFill/>
+          </a:ln>
+        </p:spPr>
+        <p:style>
+          <a:lnRef idx="2">
+            <a:schemeClr val="accent1">
+              <a:shade val="50000"/>
+            </a:schemeClr>
+          </a:lnRef>
+          <a:fillRef idx="1">
+            <a:schemeClr val="accent1"/>
+          </a:fillRef>
+          <a:effectRef idx="0">
+            <a:schemeClr val="accent1"/>
+          </a:effectRef>
+          <a:fontRef idx="minor">
+            <a:schemeClr val="lt1"/>
+          </a:fontRef>
+        </p:style>
+        <p:txBody>
+          <a:bodyPr rtlCol="0" anchor="ctr"/>
+          <a:lstStyle/>
+          <a:p>
+            <a:pPr algn="ctr"/>
+            <a:endParaRPr lang="en-US"/>
+          </a:p>
+        </p:txBody>
+      </p:sp>
+      <p:sp>
+        <p:nvSpPr>
+          <p:cNvPr id="23" name="Rectangle 22">
+            <a:extLst>
+              <a:ext uri="{FF2B5EF4-FFF2-40B4-BE49-F238E27FC236}">
+                <a16:creationId xmlns:a16="http://schemas.microsoft.com/office/drawing/2014/main" id="{C0C70AF6-E364-4E39-8702-38BDB2AB6A60}"/>
+              </a:ext>
+            </a:extLst>
+          </p:cNvPr>
+          <p:cNvSpPr/>
+          <p:nvPr/>
+        </p:nvSpPr>
+        <p:spPr>
+          <a:xfrm>
+            <a:off x="0" y="6635788"/>
+            <a:ext cx="12192000" cy="227974"/>
+          </a:xfrm>
+          <a:prstGeom prst="rect">
+            <a:avLst/>
+          </a:prstGeom>
+          <a:solidFill>
+            <a:schemeClr val="accent3"/>
+          </a:solidFill>
+          <a:ln>
+            <a:noFill/>
+          </a:ln>
+        </p:spPr>
+        <p:style>
+          <a:lnRef idx="2">
+            <a:schemeClr val="accent1">
+              <a:shade val="50000"/>
+            </a:schemeClr>
+          </a:lnRef>
+          <a:fillRef idx="1">
+            <a:schemeClr val="accent1"/>
+          </a:fillRef>
+          <a:effectRef idx="0">
+            <a:schemeClr val="accent1"/>
+          </a:effectRef>
+          <a:fontRef idx="minor">
+            <a:schemeClr val="lt1"/>
+          </a:fontRef>
+        </p:style>
+        <p:txBody>
+          <a:bodyPr rtlCol="0" anchor="ctr"/>
+          <a:lstStyle/>
+          <a:p>
+            <a:pPr algn="ctr"/>
+            <a:endParaRPr lang="en-US"/>
+          </a:p>
+        </p:txBody>
+      </p:sp>
+      <p:sp>
+        <p:nvSpPr>
+          <p:cNvPr id="2" name="TextBox 1">
+            <a:extLst>
+              <a:ext uri="{FF2B5EF4-FFF2-40B4-BE49-F238E27FC236}">
+                <a16:creationId xmlns:a16="http://schemas.microsoft.com/office/drawing/2014/main" id="{E71E8B74-100F-C808-9EBF-26AB09D35616}"/>
+              </a:ext>
+            </a:extLst>
+          </p:cNvPr>
+          <p:cNvSpPr txBox="1"/>
+          <p:nvPr/>
+        </p:nvSpPr>
+        <p:spPr>
+          <a:xfrm>
+            <a:off x="2525870" y="564169"/>
+            <a:ext cx="7140259" cy="769441"/>
+          </a:xfrm>
+          <a:prstGeom prst="rect">
+            <a:avLst/>
+          </a:prstGeom>
+          <a:noFill/>
+        </p:spPr>
+        <p:txBody>
+          <a:bodyPr wrap="square" rtlCol="0">
+            <a:spAutoFit/>
+          </a:bodyPr>
+          <a:lstStyle/>
+          <a:p>
+            <a:pPr algn="ctr"/>
+            <a:r>
+              <a:rPr lang="en-US" sz="4400" b="1" dirty="0">
+                <a:solidFill>
+                  <a:schemeClr val="accent2"/>
+                </a:solidFill>
+                <a:latin typeface="Open Sans" panose="020B0606030504020204" pitchFamily="34" charset="0"/>
+                <a:ea typeface="Open Sans" panose="020B0606030504020204" pitchFamily="34" charset="0"/>
+                <a:cs typeface="Open Sans" panose="020B0606030504020204" pitchFamily="34" charset="0"/>
+              </a:rPr>
+              <a:t>Day 2</a:t>
+            </a:r>
+          </a:p>
+        </p:txBody>
+      </p:sp>
+      <p:sp>
+        <p:nvSpPr>
+          <p:cNvPr id="3" name="Content Placeholder 2">
+            <a:extLst>
+              <a:ext uri="{FF2B5EF4-FFF2-40B4-BE49-F238E27FC236}">
+                <a16:creationId xmlns:a16="http://schemas.microsoft.com/office/drawing/2014/main" id="{87233FFD-E4C9-921F-7359-86A2249FD4F3}"/>
+              </a:ext>
+            </a:extLst>
+          </p:cNvPr>
+          <p:cNvSpPr txBox="1">
+            <a:spLocks/>
+          </p:cNvSpPr>
+          <p:nvPr/>
+        </p:nvSpPr>
+        <p:spPr>
+          <a:xfrm>
+            <a:off x="713913" y="1577050"/>
+            <a:ext cx="10515600" cy="4351338"/>
+          </a:xfrm>
+          <a:prstGeom prst="rect">
+            <a:avLst/>
+          </a:prstGeom>
+        </p:spPr>
+        <p:txBody>
+          <a:bodyPr/>
+          <a:lstStyle>
+            <a:lvl1pPr marL="228600" indent="-228600" algn="l" defTabSz="914400" rtl="0" eaLnBrk="1" latinLnBrk="0" hangingPunct="1">
+              <a:lnSpc>
+                <a:spcPct val="90000"/>
+              </a:lnSpc>
+              <a:spcBef>
+                <a:spcPts val="1000"/>
+              </a:spcBef>
+              <a:buFont typeface="Arial" panose="020B0604020202020204" pitchFamily="34" charset="0"/>
+              <a:buChar char="•"/>
+              <a:defRPr sz="2800" kern="1200">
+                <a:solidFill>
+                  <a:schemeClr val="tx1"/>
+                </a:solidFill>
+                <a:latin typeface="+mn-lt"/>
+                <a:ea typeface="+mn-ea"/>
+                <a:cs typeface="+mn-cs"/>
+              </a:defRPr>
+            </a:lvl1pPr>
+            <a:lvl2pPr marL="685800" indent="-228600" algn="l" defTabSz="914400" rtl="0" eaLnBrk="1" latinLnBrk="0" hangingPunct="1">
+              <a:lnSpc>
+                <a:spcPct val="90000"/>
+              </a:lnSpc>
+              <a:spcBef>
+                <a:spcPts val="500"/>
+              </a:spcBef>
+              <a:buFont typeface="Arial" panose="020B0604020202020204" pitchFamily="34" charset="0"/>
+              <a:buChar char="•"/>
+              <a:defRPr sz="2400" kern="1200">
+                <a:solidFill>
+                  <a:schemeClr val="tx1"/>
+                </a:solidFill>
+                <a:latin typeface="+mn-lt"/>
+                <a:ea typeface="+mn-ea"/>
+                <a:cs typeface="+mn-cs"/>
+              </a:defRPr>
+            </a:lvl2pPr>
+            <a:lvl3pPr marL="1143000" indent="-228600" algn="l" defTabSz="914400" rtl="0" eaLnBrk="1" latinLnBrk="0" hangingPunct="1">
+              <a:lnSpc>
+                <a:spcPct val="90000"/>
+              </a:lnSpc>
+              <a:spcBef>
+                <a:spcPts val="500"/>
+              </a:spcBef>
+              <a:buFont typeface="Arial" panose="020B0604020202020204" pitchFamily="34" charset="0"/>
+              <a:buChar char="•"/>
+              <a:defRPr sz="2000" kern="1200">
+                <a:solidFill>
+                  <a:schemeClr val="tx1"/>
+                </a:solidFill>
+                <a:latin typeface="+mn-lt"/>
+                <a:ea typeface="+mn-ea"/>
+                <a:cs typeface="+mn-cs"/>
+              </a:defRPr>
+            </a:lvl3pPr>
+            <a:lvl4pPr marL="1600200" indent="-228600" algn="l" defTabSz="914400" rtl="0" eaLnBrk="1" latinLnBrk="0" hangingPunct="1">
+              <a:lnSpc>
+                <a:spcPct val="90000"/>
+              </a:lnSpc>
+              <a:spcBef>
+                <a:spcPts val="500"/>
+              </a:spcBef>
+              <a:buFont typeface="Arial" panose="020B0604020202020204" pitchFamily="34" charset="0"/>
+              <a:buChar char="•"/>
+              <a:defRPr sz="1800" kern="1200">
+                <a:solidFill>
+                  <a:schemeClr val="tx1"/>
+                </a:solidFill>
+                <a:latin typeface="+mn-lt"/>
+                <a:ea typeface="+mn-ea"/>
+                <a:cs typeface="+mn-cs"/>
+              </a:defRPr>
+            </a:lvl4pPr>
+            <a:lvl5pPr marL="2057400" indent="-228600" algn="l" defTabSz="914400" rtl="0" eaLnBrk="1" latinLnBrk="0" hangingPunct="1">
+              <a:lnSpc>
+                <a:spcPct val="90000"/>
+              </a:lnSpc>
+              <a:spcBef>
+                <a:spcPts val="500"/>
+              </a:spcBef>
+              <a:buFont typeface="Arial" panose="020B0604020202020204" pitchFamily="34" charset="0"/>
+              <a:buChar char="•"/>
+              <a:defRPr sz="1800" kern="1200">
+                <a:solidFill>
+                  <a:schemeClr val="tx1"/>
+                </a:solidFill>
+                <a:latin typeface="+mn-lt"/>
+                <a:ea typeface="+mn-ea"/>
+                <a:cs typeface="+mn-cs"/>
+              </a:defRPr>
+            </a:lvl5pPr>
+            <a:lvl6pPr marL="2514600" indent="-228600" algn="l" defTabSz="914400" rtl="0" eaLnBrk="1" latinLnBrk="0" hangingPunct="1">
+              <a:lnSpc>
+                <a:spcPct val="90000"/>
+              </a:lnSpc>
+              <a:spcBef>
+                <a:spcPts val="500"/>
+              </a:spcBef>
+              <a:buFont typeface="Arial" panose="020B0604020202020204" pitchFamily="34" charset="0"/>
+              <a:buChar char="•"/>
+              <a:defRPr sz="1800" kern="1200">
+                <a:solidFill>
+                  <a:schemeClr val="tx1"/>
+                </a:solidFill>
+                <a:latin typeface="+mn-lt"/>
+                <a:ea typeface="+mn-ea"/>
+                <a:cs typeface="+mn-cs"/>
+              </a:defRPr>
+            </a:lvl6pPr>
+            <a:lvl7pPr marL="2971800" indent="-228600" algn="l" defTabSz="914400" rtl="0" eaLnBrk="1" latinLnBrk="0" hangingPunct="1">
+              <a:lnSpc>
+                <a:spcPct val="90000"/>
+              </a:lnSpc>
+              <a:spcBef>
+                <a:spcPts val="500"/>
+              </a:spcBef>
+              <a:buFont typeface="Arial" panose="020B0604020202020204" pitchFamily="34" charset="0"/>
+              <a:buChar char="•"/>
+              <a:defRPr sz="1800" kern="1200">
+                <a:solidFill>
+                  <a:schemeClr val="tx1"/>
+                </a:solidFill>
+                <a:latin typeface="+mn-lt"/>
+                <a:ea typeface="+mn-ea"/>
+                <a:cs typeface="+mn-cs"/>
+              </a:defRPr>
+            </a:lvl7pPr>
+            <a:lvl8pPr marL="3429000" indent="-228600" algn="l" defTabSz="914400" rtl="0" eaLnBrk="1" latinLnBrk="0" hangingPunct="1">
+              <a:lnSpc>
+                <a:spcPct val="90000"/>
+              </a:lnSpc>
+              <a:spcBef>
+                <a:spcPts val="500"/>
+              </a:spcBef>
+              <a:buFont typeface="Arial" panose="020B0604020202020204" pitchFamily="34" charset="0"/>
+              <a:buChar char="•"/>
+              <a:defRPr sz="1800" kern="1200">
+                <a:solidFill>
+                  <a:schemeClr val="tx1"/>
+                </a:solidFill>
+                <a:latin typeface="+mn-lt"/>
+                <a:ea typeface="+mn-ea"/>
+                <a:cs typeface="+mn-cs"/>
+              </a:defRPr>
+            </a:lvl8pPr>
+            <a:lvl9pPr marL="3886200" indent="-228600" algn="l" defTabSz="914400" rtl="0" eaLnBrk="1" latinLnBrk="0" hangingPunct="1">
+              <a:lnSpc>
+                <a:spcPct val="90000"/>
+              </a:lnSpc>
+              <a:spcBef>
+                <a:spcPts val="500"/>
+              </a:spcBef>
+              <a:buFont typeface="Arial" panose="020B0604020202020204" pitchFamily="34" charset="0"/>
+              <a:buChar char="•"/>
+              <a:defRPr sz="1800" kern="1200">
+                <a:solidFill>
+                  <a:schemeClr val="tx1"/>
+                </a:solidFill>
+                <a:latin typeface="+mn-lt"/>
+                <a:ea typeface="+mn-ea"/>
+                <a:cs typeface="+mn-cs"/>
+              </a:defRPr>
+            </a:lvl9pPr>
+          </a:lstStyle>
+          <a:p>
+            <a:pPr>
+              <a:buFont typeface="Courier New" panose="02070309020205020404" pitchFamily="49" charset="0"/>
+              <a:buChar char="o"/>
+            </a:pPr>
+            <a:r>
+              <a:rPr lang="en-US" dirty="0"/>
+              <a:t>Improving our existing model. Diff Techniques we can apply</a:t>
+            </a:r>
+          </a:p>
+          <a:p>
+            <a:pPr>
+              <a:buFont typeface="Courier New" panose="02070309020205020404" pitchFamily="49" charset="0"/>
+              <a:buChar char="o"/>
+            </a:pPr>
+            <a:r>
+              <a:rPr lang="en-US" dirty="0"/>
+              <a:t>Model Complex Relationships</a:t>
+            </a:r>
+          </a:p>
+          <a:p>
+            <a:pPr>
+              <a:buFont typeface="Courier New" panose="02070309020205020404" pitchFamily="49" charset="0"/>
+              <a:buChar char="o"/>
+            </a:pPr>
+            <a:r>
+              <a:rPr lang="en-US" dirty="0"/>
+              <a:t>Data Seeding</a:t>
+            </a:r>
+          </a:p>
+          <a:p>
+            <a:pPr>
+              <a:buFont typeface="Courier New" panose="02070309020205020404" pitchFamily="49" charset="0"/>
+              <a:buChar char="o"/>
+            </a:pPr>
+            <a:r>
+              <a:rPr lang="en-US" dirty="0"/>
+              <a:t>Logging Techniques</a:t>
+            </a:r>
+          </a:p>
+          <a:p>
+            <a:pPr>
+              <a:buFont typeface="Courier New" panose="02070309020205020404" pitchFamily="49" charset="0"/>
+              <a:buChar char="o"/>
+            </a:pPr>
+            <a:r>
+              <a:rPr lang="en-US" dirty="0"/>
+              <a:t>Lazy Loading vs Eager Loading</a:t>
+            </a:r>
+          </a:p>
+          <a:p>
+            <a:pPr>
+              <a:buFont typeface="Courier New" panose="02070309020205020404" pitchFamily="49" charset="0"/>
+              <a:buChar char="o"/>
+            </a:pPr>
+            <a:r>
+              <a:rPr lang="en-US" dirty="0"/>
+              <a:t>Change Tracker</a:t>
+            </a:r>
+          </a:p>
+        </p:txBody>
+      </p:sp>
+    </p:spTree>
+    <p:extLst>
+      <p:ext uri="{BB962C8B-B14F-4D97-AF65-F5344CB8AC3E}">
+        <p14:creationId xmlns:p14="http://schemas.microsoft.com/office/powerpoint/2010/main" val="367748314"/>
+      </p:ext>
+    </p:extLst>
+  </p:cSld>
+  <p:clrMapOvr>
+    <a:masterClrMapping/>
+  </p:clrMapOvr>
+  <mc:AlternateContent xmlns:mc="http://schemas.openxmlformats.org/markup-compatibility/2006" xmlns:p14="http://schemas.microsoft.com/office/powerpoint/2010/main">
+    <mc:Choice Requires="p14">
+      <p:transition spd="med" p14:dur="700">
+        <p:fade/>
+      </p:transition>
+    </mc:Choice>
+    <mc:Fallback xmlns="">
+      <p:transition spd="med">
+        <p:fade/>
+      </p:transition>
+    </mc:Fallback>
+  </mc:AlternateContent>
+  <p:timing>
+    <p:tnLst>
+      <p:par>
+        <p:cTn id="1" dur="indefinite" restart="never" nodeType="tmRoot">
+          <p:childTnLst>
+            <p:seq concurrent="1" nextAc="seek">
+              <p:cTn id="2" dur="indefinite" nodeType="mainSeq">
+                <p:childTnLst>
+                  <p:par>
+                    <p:cTn id="3" fill="hold">
+                      <p:stCondLst>
+                        <p:cond delay="indefinite"/>
+                      </p:stCondLst>
+                      <p:childTnLst>
+                        <p:par>
+                          <p:cTn id="4" fill="hold">
+                            <p:stCondLst>
+                              <p:cond delay="0"/>
+                            </p:stCondLst>
+                            <p:childTnLst>
+                              <p:par>
+                                <p:cTn id="5" presetID="10" presetClass="entr" presetSubtype="0" fill="hold" grpId="0" nodeType="clickEffect">
+                                  <p:stCondLst>
+                                    <p:cond delay="0"/>
+                                  </p:stCondLst>
+                                  <p:childTnLst>
+                                    <p:set>
+                                      <p:cBhvr>
+                                        <p:cTn id="6" dur="1" fill="hold">
+                                          <p:stCondLst>
+                                            <p:cond delay="0"/>
+                                          </p:stCondLst>
+                                        </p:cTn>
+                                        <p:tgtEl>
+                                          <p:spTgt spid="3">
+                                            <p:txEl>
+                                              <p:pRg st="0" end="0"/>
+                                            </p:txEl>
+                                          </p:spTgt>
+                                        </p:tgtEl>
+                                        <p:attrNameLst>
+                                          <p:attrName>style.visibility</p:attrName>
+                                        </p:attrNameLst>
+                                      </p:cBhvr>
+                                      <p:to>
+                                        <p:strVal val="visible"/>
+                                      </p:to>
+                                    </p:set>
+                                    <p:animEffect transition="in" filter="fade">
+                                      <p:cBhvr>
+                                        <p:cTn id="7" dur="500"/>
+                                        <p:tgtEl>
+                                          <p:spTgt spid="3">
+                                            <p:txEl>
+                                              <p:pRg st="0" end="0"/>
+                                            </p:txEl>
+                                          </p:spTgt>
+                                        </p:tgtEl>
+                                      </p:cBhvr>
+                                    </p:animEffect>
+                                  </p:childTnLst>
+                                </p:cTn>
+                              </p:par>
+                            </p:childTnLst>
+                          </p:cTn>
+                        </p:par>
+                      </p:childTnLst>
+                    </p:cTn>
+                  </p:par>
+                  <p:par>
+                    <p:cTn id="8" fill="hold">
+                      <p:stCondLst>
+                        <p:cond delay="indefinite"/>
+                      </p:stCondLst>
+                      <p:childTnLst>
+                        <p:par>
+                          <p:cTn id="9" fill="hold">
+                            <p:stCondLst>
+                              <p:cond delay="0"/>
+                            </p:stCondLst>
+                            <p:childTnLst>
+                              <p:par>
+                                <p:cTn id="10" presetID="10" presetClass="entr" presetSubtype="0" fill="hold" grpId="0" nodeType="clickEffect">
+                                  <p:stCondLst>
+                                    <p:cond delay="0"/>
+                                  </p:stCondLst>
+                                  <p:childTnLst>
+                                    <p:set>
+                                      <p:cBhvr>
+                                        <p:cTn id="11" dur="1" fill="hold">
+                                          <p:stCondLst>
+                                            <p:cond delay="0"/>
+                                          </p:stCondLst>
+                                        </p:cTn>
+                                        <p:tgtEl>
+                                          <p:spTgt spid="3">
+                                            <p:txEl>
+                                              <p:pRg st="1" end="1"/>
+                                            </p:txEl>
+                                          </p:spTgt>
+                                        </p:tgtEl>
+                                        <p:attrNameLst>
+                                          <p:attrName>style.visibility</p:attrName>
+                                        </p:attrNameLst>
+                                      </p:cBhvr>
+                                      <p:to>
+                                        <p:strVal val="visible"/>
+                                      </p:to>
+                                    </p:set>
+                                    <p:animEffect transition="in" filter="fade">
+                                      <p:cBhvr>
+                                        <p:cTn id="12" dur="500"/>
+                                        <p:tgtEl>
+                                          <p:spTgt spid="3">
+                                            <p:txEl>
+                                              <p:pRg st="1" end="1"/>
+                                            </p:txEl>
+                                          </p:spTgt>
+                                        </p:tgtEl>
+                                      </p:cBhvr>
+                                    </p:animEffect>
+                                  </p:childTnLst>
+                                </p:cTn>
+                              </p:par>
+                            </p:childTnLst>
+                          </p:cTn>
+                        </p:par>
+                      </p:childTnLst>
+                    </p:cTn>
+                  </p:par>
+                  <p:par>
+                    <p:cTn id="13" fill="hold">
+                      <p:stCondLst>
+                        <p:cond delay="indefinite"/>
+                      </p:stCondLst>
+                      <p:childTnLst>
+                        <p:par>
+                          <p:cTn id="14" fill="hold">
+                            <p:stCondLst>
+                              <p:cond delay="0"/>
+                            </p:stCondLst>
+                            <p:childTnLst>
+                              <p:par>
+                                <p:cTn id="15" presetID="10" presetClass="entr" presetSubtype="0" fill="hold" grpId="0" nodeType="clickEffect">
+                                  <p:stCondLst>
+                                    <p:cond delay="0"/>
+                                  </p:stCondLst>
+                                  <p:childTnLst>
+                                    <p:set>
+                                      <p:cBhvr>
+                                        <p:cTn id="16" dur="1" fill="hold">
+                                          <p:stCondLst>
+                                            <p:cond delay="0"/>
+                                          </p:stCondLst>
+                                        </p:cTn>
+                                        <p:tgtEl>
+                                          <p:spTgt spid="3">
+                                            <p:txEl>
+                                              <p:pRg st="2" end="2"/>
+                                            </p:txEl>
+                                          </p:spTgt>
+                                        </p:tgtEl>
+                                        <p:attrNameLst>
+                                          <p:attrName>style.visibility</p:attrName>
+                                        </p:attrNameLst>
+                                      </p:cBhvr>
+                                      <p:to>
+                                        <p:strVal val="visible"/>
+                                      </p:to>
+                                    </p:set>
+                                    <p:animEffect transition="in" filter="fade">
+                                      <p:cBhvr>
+                                        <p:cTn id="17" dur="500"/>
+                                        <p:tgtEl>
+                                          <p:spTgt spid="3">
+                                            <p:txEl>
+                                              <p:pRg st="2" end="2"/>
+                                            </p:txEl>
+                                          </p:spTgt>
+                                        </p:tgtEl>
+                                      </p:cBhvr>
+                                    </p:animEffect>
+                                  </p:childTnLst>
+                                </p:cTn>
+                              </p:par>
+                            </p:childTnLst>
+                          </p:cTn>
+                        </p:par>
+                      </p:childTnLst>
+                    </p:cTn>
+                  </p:par>
+                  <p:par>
+                    <p:cTn id="18" fill="hold">
+                      <p:stCondLst>
+                        <p:cond delay="indefinite"/>
+                      </p:stCondLst>
+                      <p:childTnLst>
+                        <p:par>
+                          <p:cTn id="19" fill="hold">
+                            <p:stCondLst>
+                              <p:cond delay="0"/>
+                            </p:stCondLst>
+                            <p:childTnLst>
+                              <p:par>
+                                <p:cTn id="20" presetID="10" presetClass="entr" presetSubtype="0" fill="hold" grpId="0" nodeType="clickEffect">
+                                  <p:stCondLst>
+                                    <p:cond delay="0"/>
+                                  </p:stCondLst>
+                                  <p:childTnLst>
+                                    <p:set>
+                                      <p:cBhvr>
+                                        <p:cTn id="21" dur="1" fill="hold">
+                                          <p:stCondLst>
+                                            <p:cond delay="0"/>
+                                          </p:stCondLst>
+                                        </p:cTn>
+                                        <p:tgtEl>
+                                          <p:spTgt spid="3">
+                                            <p:txEl>
+                                              <p:pRg st="3" end="3"/>
+                                            </p:txEl>
+                                          </p:spTgt>
+                                        </p:tgtEl>
+                                        <p:attrNameLst>
+                                          <p:attrName>style.visibility</p:attrName>
+                                        </p:attrNameLst>
+                                      </p:cBhvr>
+                                      <p:to>
+                                        <p:strVal val="visible"/>
+                                      </p:to>
+                                    </p:set>
+                                    <p:animEffect transition="in" filter="fade">
+                                      <p:cBhvr>
+                                        <p:cTn id="22" dur="500"/>
+                                        <p:tgtEl>
+                                          <p:spTgt spid="3">
+                                            <p:txEl>
+                                              <p:pRg st="3" end="3"/>
+                                            </p:txEl>
+                                          </p:spTgt>
+                                        </p:tgtEl>
+                                      </p:cBhvr>
+                                    </p:animEffect>
+                                  </p:childTnLst>
+                                </p:cTn>
+                              </p:par>
+                            </p:childTnLst>
+                          </p:cTn>
+                        </p:par>
+                      </p:childTnLst>
+                    </p:cTn>
+                  </p:par>
+                  <p:par>
+                    <p:cTn id="23" fill="hold">
+                      <p:stCondLst>
+                        <p:cond delay="indefinite"/>
+                      </p:stCondLst>
+                      <p:childTnLst>
+                        <p:par>
+                          <p:cTn id="24" fill="hold">
+                            <p:stCondLst>
+                              <p:cond delay="0"/>
+                            </p:stCondLst>
+                            <p:childTnLst>
+                              <p:par>
+                                <p:cTn id="25" presetID="10" presetClass="entr" presetSubtype="0" fill="hold" grpId="0" nodeType="clickEffect">
+                                  <p:stCondLst>
+                                    <p:cond delay="0"/>
+                                  </p:stCondLst>
+                                  <p:childTnLst>
+                                    <p:set>
+                                      <p:cBhvr>
+                                        <p:cTn id="26" dur="1" fill="hold">
+                                          <p:stCondLst>
+                                            <p:cond delay="0"/>
+                                          </p:stCondLst>
+                                        </p:cTn>
+                                        <p:tgtEl>
+                                          <p:spTgt spid="3">
+                                            <p:txEl>
+                                              <p:pRg st="4" end="4"/>
+                                            </p:txEl>
+                                          </p:spTgt>
+                                        </p:tgtEl>
+                                        <p:attrNameLst>
+                                          <p:attrName>style.visibility</p:attrName>
+                                        </p:attrNameLst>
+                                      </p:cBhvr>
+                                      <p:to>
+                                        <p:strVal val="visible"/>
+                                      </p:to>
+                                    </p:set>
+                                    <p:animEffect transition="in" filter="fade">
+                                      <p:cBhvr>
+                                        <p:cTn id="27" dur="500"/>
+                                        <p:tgtEl>
+                                          <p:spTgt spid="3">
+                                            <p:txEl>
+                                              <p:pRg st="4" end="4"/>
+                                            </p:txEl>
+                                          </p:spTgt>
+                                        </p:tgtEl>
+                                      </p:cBhvr>
+                                    </p:animEffect>
+                                  </p:childTnLst>
+                                </p:cTn>
+                              </p:par>
+                            </p:childTnLst>
+                          </p:cTn>
+                        </p:par>
+                      </p:childTnLst>
+                    </p:cTn>
+                  </p:par>
+                  <p:par>
+                    <p:cTn id="28" fill="hold">
+                      <p:stCondLst>
+                        <p:cond delay="indefinite"/>
+                      </p:stCondLst>
+                      <p:childTnLst>
+                        <p:par>
+                          <p:cTn id="29" fill="hold">
+                            <p:stCondLst>
+                              <p:cond delay="0"/>
+                            </p:stCondLst>
+                            <p:childTnLst>
+                              <p:par>
+                                <p:cTn id="30" presetID="10" presetClass="entr" presetSubtype="0" fill="hold" grpId="0" nodeType="clickEffect">
+                                  <p:stCondLst>
+                                    <p:cond delay="0"/>
+                                  </p:stCondLst>
+                                  <p:childTnLst>
+                                    <p:set>
+                                      <p:cBhvr>
+                                        <p:cTn id="31" dur="1" fill="hold">
+                                          <p:stCondLst>
+                                            <p:cond delay="0"/>
+                                          </p:stCondLst>
+                                        </p:cTn>
+                                        <p:tgtEl>
+                                          <p:spTgt spid="3">
+                                            <p:txEl>
+                                              <p:pRg st="5" end="5"/>
+                                            </p:txEl>
+                                          </p:spTgt>
+                                        </p:tgtEl>
+                                        <p:attrNameLst>
+                                          <p:attrName>style.visibility</p:attrName>
+                                        </p:attrNameLst>
+                                      </p:cBhvr>
+                                      <p:to>
+                                        <p:strVal val="visible"/>
+                                      </p:to>
+                                    </p:set>
+                                    <p:animEffect transition="in" filter="fade">
+                                      <p:cBhvr>
+                                        <p:cTn id="32" dur="500"/>
+                                        <p:tgtEl>
+                                          <p:spTgt spid="3">
+                                            <p:txEl>
+                                              <p:pRg st="5" end="5"/>
+                                            </p:txEl>
+                                          </p:spTgt>
+                                        </p:tgtEl>
+                                      </p:cBhvr>
+                                    </p:animEffect>
+                                  </p:childTnLst>
+                                </p:cTn>
+                              </p:par>
+                            </p:childTnLst>
+                          </p:cTn>
+                        </p:par>
+                      </p:childTnLst>
+                    </p:cTn>
+                  </p:par>
+                </p:childTnLst>
+              </p:cTn>
+              <p:prevCondLst>
+                <p:cond evt="onPrev" delay="0">
+                  <p:tgtEl>
+                    <p:sldTgt/>
+                  </p:tgtEl>
+                </p:cond>
+              </p:prevCondLst>
+              <p:nextCondLst>
+                <p:cond evt="onNext" delay="0">
+                  <p:tgtEl>
+                    <p:sldTgt/>
+                  </p:tgtEl>
+                </p:cond>
+              </p:nextCondLst>
+            </p:seq>
+          </p:childTnLst>
+        </p:cTn>
+      </p:par>
+    </p:tnLst>
+    <p:bldLst>
+      <p:bldP spid="3" grpId="0" build="p"/>
+    </p:bldLst>
+  </p:timing>
+</p:sld>
+</file>
+
+<file path=ppt/slides/slide11.xml><?xml version="1.0" encoding="utf-8"?>
+<p:sld xmlns:a="http://schemas.openxmlformats.org/drawingml/2006/main" xmlns:r="http://schemas.openxmlformats.org/officeDocument/2006/relationships" xmlns:p="http://schemas.openxmlformats.org/presentationml/2006/main">
+  <p:cSld>
+    <p:spTree>
+      <p:nvGrpSpPr>
+        <p:cNvPr id="1" name=""/>
+        <p:cNvGrpSpPr/>
+        <p:nvPr/>
+      </p:nvGrpSpPr>
+      <p:grpSpPr>
+        <a:xfrm>
+          <a:off x="0" y="0"/>
+          <a:ext cx="0" cy="0"/>
+          <a:chOff x="0" y="0"/>
+          <a:chExt cx="0" cy="0"/>
+        </a:xfrm>
+      </p:grpSpPr>
+      <p:sp>
+        <p:nvSpPr>
+          <p:cNvPr id="22" name="Rectangle 21">
+            <a:extLst>
+              <a:ext uri="{FF2B5EF4-FFF2-40B4-BE49-F238E27FC236}">
+                <a16:creationId xmlns:a16="http://schemas.microsoft.com/office/drawing/2014/main" id="{422D24B8-5366-4F60-8DB7-03104991E720}"/>
+              </a:ext>
+            </a:extLst>
+          </p:cNvPr>
+          <p:cNvSpPr/>
+          <p:nvPr/>
+        </p:nvSpPr>
+        <p:spPr>
+          <a:xfrm>
+            <a:off x="0" y="0"/>
+            <a:ext cx="12192000" cy="227974"/>
+          </a:xfrm>
+          <a:prstGeom prst="rect">
+            <a:avLst/>
+          </a:prstGeom>
+          <a:solidFill>
+            <a:schemeClr val="accent2"/>
+          </a:solidFill>
+          <a:ln>
+            <a:noFill/>
+          </a:ln>
+        </p:spPr>
+        <p:style>
+          <a:lnRef idx="2">
+            <a:schemeClr val="accent1">
+              <a:shade val="50000"/>
+            </a:schemeClr>
+          </a:lnRef>
+          <a:fillRef idx="1">
+            <a:schemeClr val="accent1"/>
+          </a:fillRef>
+          <a:effectRef idx="0">
+            <a:schemeClr val="accent1"/>
+          </a:effectRef>
+          <a:fontRef idx="minor">
+            <a:schemeClr val="lt1"/>
+          </a:fontRef>
+        </p:style>
+        <p:txBody>
+          <a:bodyPr rtlCol="0" anchor="ctr"/>
+          <a:lstStyle/>
+          <a:p>
+            <a:pPr algn="ctr"/>
+            <a:endParaRPr lang="en-US"/>
+          </a:p>
+        </p:txBody>
+      </p:sp>
+      <p:sp>
+        <p:nvSpPr>
+          <p:cNvPr id="23" name="Rectangle 22">
+            <a:extLst>
+              <a:ext uri="{FF2B5EF4-FFF2-40B4-BE49-F238E27FC236}">
+                <a16:creationId xmlns:a16="http://schemas.microsoft.com/office/drawing/2014/main" id="{C0C70AF6-E364-4E39-8702-38BDB2AB6A60}"/>
+              </a:ext>
+            </a:extLst>
+          </p:cNvPr>
+          <p:cNvSpPr/>
+          <p:nvPr/>
+        </p:nvSpPr>
+        <p:spPr>
+          <a:xfrm>
+            <a:off x="0" y="6635788"/>
+            <a:ext cx="12192000" cy="227974"/>
+          </a:xfrm>
+          <a:prstGeom prst="rect">
+            <a:avLst/>
+          </a:prstGeom>
+          <a:solidFill>
+            <a:schemeClr val="accent3"/>
+          </a:solidFill>
+          <a:ln>
+            <a:noFill/>
+          </a:ln>
+        </p:spPr>
+        <p:style>
+          <a:lnRef idx="2">
+            <a:schemeClr val="accent1">
+              <a:shade val="50000"/>
+            </a:schemeClr>
+          </a:lnRef>
+          <a:fillRef idx="1">
+            <a:schemeClr val="accent1"/>
+          </a:fillRef>
+          <a:effectRef idx="0">
+            <a:schemeClr val="accent1"/>
+          </a:effectRef>
+          <a:fontRef idx="minor">
+            <a:schemeClr val="lt1"/>
+          </a:fontRef>
+        </p:style>
+        <p:txBody>
+          <a:bodyPr rtlCol="0" anchor="ctr"/>
+          <a:lstStyle/>
+          <a:p>
+            <a:pPr algn="ctr"/>
+            <a:endParaRPr lang="en-US"/>
+          </a:p>
+        </p:txBody>
+      </p:sp>
+      <p:sp>
+        <p:nvSpPr>
+          <p:cNvPr id="2" name="TextBox 1">
+            <a:extLst>
+              <a:ext uri="{FF2B5EF4-FFF2-40B4-BE49-F238E27FC236}">
+                <a16:creationId xmlns:a16="http://schemas.microsoft.com/office/drawing/2014/main" id="{E71E8B74-100F-C808-9EBF-26AB09D35616}"/>
+              </a:ext>
+            </a:extLst>
+          </p:cNvPr>
+          <p:cNvSpPr txBox="1"/>
+          <p:nvPr/>
+        </p:nvSpPr>
+        <p:spPr>
+          <a:xfrm>
+            <a:off x="2525870" y="564169"/>
+            <a:ext cx="7140259" cy="769441"/>
+          </a:xfrm>
+          <a:prstGeom prst="rect">
+            <a:avLst/>
+          </a:prstGeom>
+          <a:noFill/>
+        </p:spPr>
+        <p:txBody>
+          <a:bodyPr wrap="square" rtlCol="0">
+            <a:spAutoFit/>
+          </a:bodyPr>
+          <a:lstStyle/>
+          <a:p>
+            <a:pPr algn="ctr"/>
+            <a:r>
+              <a:rPr lang="en-US" sz="4400" b="1" dirty="0">
+                <a:solidFill>
+                  <a:schemeClr val="accent2"/>
+                </a:solidFill>
+                <a:latin typeface="Open Sans" panose="020B0606030504020204" pitchFamily="34" charset="0"/>
+                <a:ea typeface="Open Sans" panose="020B0606030504020204" pitchFamily="34" charset="0"/>
+                <a:cs typeface="Open Sans" panose="020B0606030504020204" pitchFamily="34" charset="0"/>
+              </a:rPr>
+              <a:t>Day 3</a:t>
+            </a:r>
+          </a:p>
+        </p:txBody>
+      </p:sp>
+      <p:sp>
+        <p:nvSpPr>
+          <p:cNvPr id="3" name="Content Placeholder 2">
+            <a:extLst>
+              <a:ext uri="{FF2B5EF4-FFF2-40B4-BE49-F238E27FC236}">
+                <a16:creationId xmlns:a16="http://schemas.microsoft.com/office/drawing/2014/main" id="{87233FFD-E4C9-921F-7359-86A2249FD4F3}"/>
+              </a:ext>
+            </a:extLst>
+          </p:cNvPr>
+          <p:cNvSpPr txBox="1">
+            <a:spLocks/>
+          </p:cNvSpPr>
+          <p:nvPr/>
+        </p:nvSpPr>
+        <p:spPr>
+          <a:xfrm>
+            <a:off x="713913" y="1577050"/>
+            <a:ext cx="10515600" cy="4351338"/>
+          </a:xfrm>
+          <a:prstGeom prst="rect">
+            <a:avLst/>
+          </a:prstGeom>
+        </p:spPr>
+        <p:txBody>
+          <a:bodyPr/>
+          <a:lstStyle>
+            <a:lvl1pPr marL="228600" indent="-228600" algn="l" defTabSz="914400" rtl="0" eaLnBrk="1" latinLnBrk="0" hangingPunct="1">
+              <a:lnSpc>
+                <a:spcPct val="90000"/>
+              </a:lnSpc>
+              <a:spcBef>
+                <a:spcPts val="1000"/>
+              </a:spcBef>
+              <a:buFont typeface="Arial" panose="020B0604020202020204" pitchFamily="34" charset="0"/>
+              <a:buChar char="•"/>
+              <a:defRPr sz="2800" kern="1200">
+                <a:solidFill>
+                  <a:schemeClr val="tx1"/>
+                </a:solidFill>
+                <a:latin typeface="+mn-lt"/>
+                <a:ea typeface="+mn-ea"/>
+                <a:cs typeface="+mn-cs"/>
+              </a:defRPr>
+            </a:lvl1pPr>
+            <a:lvl2pPr marL="685800" indent="-228600" algn="l" defTabSz="914400" rtl="0" eaLnBrk="1" latinLnBrk="0" hangingPunct="1">
+              <a:lnSpc>
+                <a:spcPct val="90000"/>
+              </a:lnSpc>
+              <a:spcBef>
+                <a:spcPts val="500"/>
+              </a:spcBef>
+              <a:buFont typeface="Arial" panose="020B0604020202020204" pitchFamily="34" charset="0"/>
+              <a:buChar char="•"/>
+              <a:defRPr sz="2400" kern="1200">
+                <a:solidFill>
+                  <a:schemeClr val="tx1"/>
+                </a:solidFill>
+                <a:latin typeface="+mn-lt"/>
+                <a:ea typeface="+mn-ea"/>
+                <a:cs typeface="+mn-cs"/>
+              </a:defRPr>
+            </a:lvl2pPr>
+            <a:lvl3pPr marL="1143000" indent="-228600" algn="l" defTabSz="914400" rtl="0" eaLnBrk="1" latinLnBrk="0" hangingPunct="1">
+              <a:lnSpc>
+                <a:spcPct val="90000"/>
+              </a:lnSpc>
+              <a:spcBef>
+                <a:spcPts val="500"/>
+              </a:spcBef>
+              <a:buFont typeface="Arial" panose="020B0604020202020204" pitchFamily="34" charset="0"/>
+              <a:buChar char="•"/>
+              <a:defRPr sz="2000" kern="1200">
+                <a:solidFill>
+                  <a:schemeClr val="tx1"/>
+                </a:solidFill>
+                <a:latin typeface="+mn-lt"/>
+                <a:ea typeface="+mn-ea"/>
+                <a:cs typeface="+mn-cs"/>
+              </a:defRPr>
+            </a:lvl3pPr>
+            <a:lvl4pPr marL="1600200" indent="-228600" algn="l" defTabSz="914400" rtl="0" eaLnBrk="1" latinLnBrk="0" hangingPunct="1">
+              <a:lnSpc>
+                <a:spcPct val="90000"/>
+              </a:lnSpc>
+              <a:spcBef>
+                <a:spcPts val="500"/>
+              </a:spcBef>
+              <a:buFont typeface="Arial" panose="020B0604020202020204" pitchFamily="34" charset="0"/>
+              <a:buChar char="•"/>
+              <a:defRPr sz="1800" kern="1200">
+                <a:solidFill>
+                  <a:schemeClr val="tx1"/>
+                </a:solidFill>
+                <a:latin typeface="+mn-lt"/>
+                <a:ea typeface="+mn-ea"/>
+                <a:cs typeface="+mn-cs"/>
+              </a:defRPr>
+            </a:lvl4pPr>
+            <a:lvl5pPr marL="2057400" indent="-228600" algn="l" defTabSz="914400" rtl="0" eaLnBrk="1" latinLnBrk="0" hangingPunct="1">
+              <a:lnSpc>
+                <a:spcPct val="90000"/>
+              </a:lnSpc>
+              <a:spcBef>
+                <a:spcPts val="500"/>
+              </a:spcBef>
+              <a:buFont typeface="Arial" panose="020B0604020202020204" pitchFamily="34" charset="0"/>
+              <a:buChar char="•"/>
+              <a:defRPr sz="1800" kern="1200">
+                <a:solidFill>
+                  <a:schemeClr val="tx1"/>
+                </a:solidFill>
+                <a:latin typeface="+mn-lt"/>
+                <a:ea typeface="+mn-ea"/>
+                <a:cs typeface="+mn-cs"/>
+              </a:defRPr>
+            </a:lvl5pPr>
+            <a:lvl6pPr marL="2514600" indent="-228600" algn="l" defTabSz="914400" rtl="0" eaLnBrk="1" latinLnBrk="0" hangingPunct="1">
+              <a:lnSpc>
+                <a:spcPct val="90000"/>
+              </a:lnSpc>
+              <a:spcBef>
+                <a:spcPts val="500"/>
+              </a:spcBef>
+              <a:buFont typeface="Arial" panose="020B0604020202020204" pitchFamily="34" charset="0"/>
+              <a:buChar char="•"/>
+              <a:defRPr sz="1800" kern="1200">
+                <a:solidFill>
+                  <a:schemeClr val="tx1"/>
+                </a:solidFill>
+                <a:latin typeface="+mn-lt"/>
+                <a:ea typeface="+mn-ea"/>
+                <a:cs typeface="+mn-cs"/>
+              </a:defRPr>
+            </a:lvl6pPr>
+            <a:lvl7pPr marL="2971800" indent="-228600" algn="l" defTabSz="914400" rtl="0" eaLnBrk="1" latinLnBrk="0" hangingPunct="1">
+              <a:lnSpc>
+                <a:spcPct val="90000"/>
+              </a:lnSpc>
+              <a:spcBef>
+                <a:spcPts val="500"/>
+              </a:spcBef>
+              <a:buFont typeface="Arial" panose="020B0604020202020204" pitchFamily="34" charset="0"/>
+              <a:buChar char="•"/>
+              <a:defRPr sz="1800" kern="1200">
+                <a:solidFill>
+                  <a:schemeClr val="tx1"/>
+                </a:solidFill>
+                <a:latin typeface="+mn-lt"/>
+                <a:ea typeface="+mn-ea"/>
+                <a:cs typeface="+mn-cs"/>
+              </a:defRPr>
+            </a:lvl7pPr>
+            <a:lvl8pPr marL="3429000" indent="-228600" algn="l" defTabSz="914400" rtl="0" eaLnBrk="1" latinLnBrk="0" hangingPunct="1">
+              <a:lnSpc>
+                <a:spcPct val="90000"/>
+              </a:lnSpc>
+              <a:spcBef>
+                <a:spcPts val="500"/>
+              </a:spcBef>
+              <a:buFont typeface="Arial" panose="020B0604020202020204" pitchFamily="34" charset="0"/>
+              <a:buChar char="•"/>
+              <a:defRPr sz="1800" kern="1200">
+                <a:solidFill>
+                  <a:schemeClr val="tx1"/>
+                </a:solidFill>
+                <a:latin typeface="+mn-lt"/>
+                <a:ea typeface="+mn-ea"/>
+                <a:cs typeface="+mn-cs"/>
+              </a:defRPr>
+            </a:lvl8pPr>
+            <a:lvl9pPr marL="3886200" indent="-228600" algn="l" defTabSz="914400" rtl="0" eaLnBrk="1" latinLnBrk="0" hangingPunct="1">
+              <a:lnSpc>
+                <a:spcPct val="90000"/>
+              </a:lnSpc>
+              <a:spcBef>
+                <a:spcPts val="500"/>
+              </a:spcBef>
+              <a:buFont typeface="Arial" panose="020B0604020202020204" pitchFamily="34" charset="0"/>
+              <a:buChar char="•"/>
+              <a:defRPr sz="1800" kern="1200">
+                <a:solidFill>
+                  <a:schemeClr val="tx1"/>
+                </a:solidFill>
+                <a:latin typeface="+mn-lt"/>
+                <a:ea typeface="+mn-ea"/>
+                <a:cs typeface="+mn-cs"/>
+              </a:defRPr>
+            </a:lvl9pPr>
+          </a:lstStyle>
+          <a:p>
+            <a:pPr>
+              <a:buFont typeface="Courier New" panose="02070309020205020404" pitchFamily="49" charset="0"/>
+              <a:buChar char="o"/>
+            </a:pPr>
+            <a:r>
+              <a:rPr lang="en-US" dirty="0"/>
+              <a:t>Writing our own SQL queries</a:t>
+            </a:r>
+          </a:p>
+          <a:p>
+            <a:pPr>
+              <a:buFont typeface="Courier New" panose="02070309020205020404" pitchFamily="49" charset="0"/>
+              <a:buChar char="o"/>
+            </a:pPr>
+            <a:r>
+              <a:rPr lang="en-US" dirty="0"/>
+              <a:t>Transaction</a:t>
+            </a:r>
+          </a:p>
+          <a:p>
+            <a:pPr>
+              <a:buFont typeface="Courier New" panose="02070309020205020404" pitchFamily="49" charset="0"/>
+              <a:buChar char="o"/>
+            </a:pPr>
+            <a:r>
+              <a:rPr lang="en-US" dirty="0" err="1"/>
+              <a:t>SqlServerTypeMapper</a:t>
+            </a:r>
+            <a:endParaRPr lang="en-US" dirty="0"/>
+          </a:p>
+          <a:p>
+            <a:pPr>
+              <a:buFont typeface="Courier New" panose="02070309020205020404" pitchFamily="49" charset="0"/>
+              <a:buChar char="o"/>
+            </a:pPr>
+            <a:r>
+              <a:rPr lang="en-US" dirty="0" err="1"/>
+              <a:t>ModelBuilder</a:t>
+            </a:r>
+            <a:r>
+              <a:rPr lang="en-US" dirty="0"/>
+              <a:t> in different files</a:t>
+            </a:r>
+          </a:p>
+          <a:p>
+            <a:pPr>
+              <a:buFont typeface="Courier New" panose="02070309020205020404" pitchFamily="49" charset="0"/>
+              <a:buChar char="o"/>
+            </a:pPr>
+            <a:r>
+              <a:rPr lang="en-US"/>
+              <a:t>Concurrency Token</a:t>
+            </a:r>
+            <a:endParaRPr lang="en-US" dirty="0"/>
+          </a:p>
+        </p:txBody>
+      </p:sp>
+    </p:spTree>
+    <p:extLst>
+      <p:ext uri="{BB962C8B-B14F-4D97-AF65-F5344CB8AC3E}">
+        <p14:creationId xmlns:p14="http://schemas.microsoft.com/office/powerpoint/2010/main" val="1848545437"/>
+      </p:ext>
+    </p:extLst>
+  </p:cSld>
+  <p:clrMapOvr>
+    <a:masterClrMapping/>
+  </p:clrMapOvr>
+  <mc:AlternateContent xmlns:mc="http://schemas.openxmlformats.org/markup-compatibility/2006" xmlns:p14="http://schemas.microsoft.com/office/powerpoint/2010/main">
+    <mc:Choice Requires="p14">
+      <p:transition spd="med" p14:dur="700">
+        <p:fade/>
+      </p:transition>
+    </mc:Choice>
+    <mc:Fallback xmlns="">
+      <p:transition spd="med">
+        <p:fade/>
+      </p:transition>
+    </mc:Fallback>
+  </mc:AlternateContent>
+  <p:timing>
+    <p:tnLst>
+      <p:par>
+        <p:cTn id="1" dur="indefinite" restart="never" nodeType="tmRoot">
+          <p:childTnLst>
+            <p:seq concurrent="1" nextAc="seek">
+              <p:cTn id="2" dur="indefinite" nodeType="mainSeq">
+                <p:childTnLst>
+                  <p:par>
+                    <p:cTn id="3" fill="hold">
+                      <p:stCondLst>
+                        <p:cond delay="indefinite"/>
+                      </p:stCondLst>
+                      <p:childTnLst>
+                        <p:par>
+                          <p:cTn id="4" fill="hold">
+                            <p:stCondLst>
+                              <p:cond delay="0"/>
+                            </p:stCondLst>
+                            <p:childTnLst>
+                              <p:par>
+                                <p:cTn id="5" presetID="10" presetClass="entr" presetSubtype="0" fill="hold" grpId="0" nodeType="clickEffect">
+                                  <p:stCondLst>
+                                    <p:cond delay="0"/>
+                                  </p:stCondLst>
+                                  <p:childTnLst>
+                                    <p:set>
+                                      <p:cBhvr>
+                                        <p:cTn id="6" dur="1" fill="hold">
+                                          <p:stCondLst>
+                                            <p:cond delay="0"/>
+                                          </p:stCondLst>
+                                        </p:cTn>
+                                        <p:tgtEl>
+                                          <p:spTgt spid="3">
+                                            <p:txEl>
+                                              <p:pRg st="0" end="0"/>
+                                            </p:txEl>
+                                          </p:spTgt>
+                                        </p:tgtEl>
+                                        <p:attrNameLst>
+                                          <p:attrName>style.visibility</p:attrName>
+                                        </p:attrNameLst>
+                                      </p:cBhvr>
+                                      <p:to>
+                                        <p:strVal val="visible"/>
+                                      </p:to>
+                                    </p:set>
+                                    <p:animEffect transition="in" filter="fade">
+                                      <p:cBhvr>
+                                        <p:cTn id="7" dur="500"/>
+                                        <p:tgtEl>
+                                          <p:spTgt spid="3">
+                                            <p:txEl>
+                                              <p:pRg st="0" end="0"/>
+                                            </p:txEl>
+                                          </p:spTgt>
+                                        </p:tgtEl>
+                                      </p:cBhvr>
+                                    </p:animEffect>
+                                  </p:childTnLst>
+                                </p:cTn>
+                              </p:par>
+                            </p:childTnLst>
+                          </p:cTn>
+                        </p:par>
+                      </p:childTnLst>
+                    </p:cTn>
+                  </p:par>
+                  <p:par>
+                    <p:cTn id="8" fill="hold">
+                      <p:stCondLst>
+                        <p:cond delay="indefinite"/>
+                      </p:stCondLst>
+                      <p:childTnLst>
+                        <p:par>
+                          <p:cTn id="9" fill="hold">
+                            <p:stCondLst>
+                              <p:cond delay="0"/>
+                            </p:stCondLst>
+                            <p:childTnLst>
+                              <p:par>
+                                <p:cTn id="10" presetID="10" presetClass="entr" presetSubtype="0" fill="hold" grpId="0" nodeType="clickEffect">
+                                  <p:stCondLst>
+                                    <p:cond delay="0"/>
+                                  </p:stCondLst>
+                                  <p:childTnLst>
+                                    <p:set>
+                                      <p:cBhvr>
+                                        <p:cTn id="11" dur="1" fill="hold">
+                                          <p:stCondLst>
+                                            <p:cond delay="0"/>
+                                          </p:stCondLst>
+                                        </p:cTn>
+                                        <p:tgtEl>
+                                          <p:spTgt spid="3">
+                                            <p:txEl>
+                                              <p:pRg st="1" end="1"/>
+                                            </p:txEl>
+                                          </p:spTgt>
+                                        </p:tgtEl>
+                                        <p:attrNameLst>
+                                          <p:attrName>style.visibility</p:attrName>
+                                        </p:attrNameLst>
+                                      </p:cBhvr>
+                                      <p:to>
+                                        <p:strVal val="visible"/>
+                                      </p:to>
+                                    </p:set>
+                                    <p:animEffect transition="in" filter="fade">
+                                      <p:cBhvr>
+                                        <p:cTn id="12" dur="500"/>
+                                        <p:tgtEl>
+                                          <p:spTgt spid="3">
+                                            <p:txEl>
+                                              <p:pRg st="1" end="1"/>
+                                            </p:txEl>
+                                          </p:spTgt>
+                                        </p:tgtEl>
+                                      </p:cBhvr>
+                                    </p:animEffect>
+                                  </p:childTnLst>
+                                </p:cTn>
+                              </p:par>
+                            </p:childTnLst>
+                          </p:cTn>
+                        </p:par>
+                      </p:childTnLst>
+                    </p:cTn>
+                  </p:par>
+                  <p:par>
+                    <p:cTn id="13" fill="hold">
+                      <p:stCondLst>
+                        <p:cond delay="indefinite"/>
+                      </p:stCondLst>
+                      <p:childTnLst>
+                        <p:par>
+                          <p:cTn id="14" fill="hold">
+                            <p:stCondLst>
+                              <p:cond delay="0"/>
+                            </p:stCondLst>
+                            <p:childTnLst>
+                              <p:par>
+                                <p:cTn id="15" presetID="10" presetClass="entr" presetSubtype="0" fill="hold" grpId="0" nodeType="clickEffect">
+                                  <p:stCondLst>
+                                    <p:cond delay="0"/>
+                                  </p:stCondLst>
+                                  <p:childTnLst>
+                                    <p:set>
+                                      <p:cBhvr>
+                                        <p:cTn id="16" dur="1" fill="hold">
+                                          <p:stCondLst>
+                                            <p:cond delay="0"/>
+                                          </p:stCondLst>
+                                        </p:cTn>
+                                        <p:tgtEl>
+                                          <p:spTgt spid="3">
+                                            <p:txEl>
+                                              <p:pRg st="2" end="2"/>
+                                            </p:txEl>
+                                          </p:spTgt>
+                                        </p:tgtEl>
+                                        <p:attrNameLst>
+                                          <p:attrName>style.visibility</p:attrName>
+                                        </p:attrNameLst>
+                                      </p:cBhvr>
+                                      <p:to>
+                                        <p:strVal val="visible"/>
+                                      </p:to>
+                                    </p:set>
+                                    <p:animEffect transition="in" filter="fade">
+                                      <p:cBhvr>
+                                        <p:cTn id="17" dur="500"/>
+                                        <p:tgtEl>
+                                          <p:spTgt spid="3">
+                                            <p:txEl>
+                                              <p:pRg st="2" end="2"/>
+                                            </p:txEl>
+                                          </p:spTgt>
+                                        </p:tgtEl>
+                                      </p:cBhvr>
+                                    </p:animEffect>
+                                  </p:childTnLst>
+                                </p:cTn>
+                              </p:par>
+                            </p:childTnLst>
+                          </p:cTn>
+                        </p:par>
+                      </p:childTnLst>
+                    </p:cTn>
+                  </p:par>
+                  <p:par>
+                    <p:cTn id="18" fill="hold">
+                      <p:stCondLst>
+                        <p:cond delay="indefinite"/>
+                      </p:stCondLst>
+                      <p:childTnLst>
+                        <p:par>
+                          <p:cTn id="19" fill="hold">
+                            <p:stCondLst>
+                              <p:cond delay="0"/>
+                            </p:stCondLst>
+                            <p:childTnLst>
+                              <p:par>
+                                <p:cTn id="20" presetID="10" presetClass="entr" presetSubtype="0" fill="hold" grpId="0" nodeType="clickEffect">
+                                  <p:stCondLst>
+                                    <p:cond delay="0"/>
+                                  </p:stCondLst>
+                                  <p:childTnLst>
+                                    <p:set>
+                                      <p:cBhvr>
+                                        <p:cTn id="21" dur="1" fill="hold">
+                                          <p:stCondLst>
+                                            <p:cond delay="0"/>
+                                          </p:stCondLst>
+                                        </p:cTn>
+                                        <p:tgtEl>
+                                          <p:spTgt spid="3">
+                                            <p:txEl>
+                                              <p:pRg st="3" end="3"/>
+                                            </p:txEl>
+                                          </p:spTgt>
+                                        </p:tgtEl>
+                                        <p:attrNameLst>
+                                          <p:attrName>style.visibility</p:attrName>
+                                        </p:attrNameLst>
+                                      </p:cBhvr>
+                                      <p:to>
+                                        <p:strVal val="visible"/>
+                                      </p:to>
+                                    </p:set>
+                                    <p:animEffect transition="in" filter="fade">
+                                      <p:cBhvr>
+                                        <p:cTn id="22" dur="500"/>
+                                        <p:tgtEl>
+                                          <p:spTgt spid="3">
+                                            <p:txEl>
+                                              <p:pRg st="3" end="3"/>
+                                            </p:txEl>
+                                          </p:spTgt>
+                                        </p:tgtEl>
+                                      </p:cBhvr>
+                                    </p:animEffect>
+                                  </p:childTnLst>
+                                </p:cTn>
+                              </p:par>
+                            </p:childTnLst>
+                          </p:cTn>
+                        </p:par>
+                      </p:childTnLst>
+                    </p:cTn>
+                  </p:par>
+                  <p:par>
+                    <p:cTn id="23" fill="hold">
+                      <p:stCondLst>
+                        <p:cond delay="indefinite"/>
+                      </p:stCondLst>
+                      <p:childTnLst>
+                        <p:par>
+                          <p:cTn id="24" fill="hold">
+                            <p:stCondLst>
+                              <p:cond delay="0"/>
+                            </p:stCondLst>
+                            <p:childTnLst>
+                              <p:par>
+                                <p:cTn id="25" presetID="10" presetClass="entr" presetSubtype="0" fill="hold" grpId="0" nodeType="clickEffect">
+                                  <p:stCondLst>
+                                    <p:cond delay="0"/>
+                                  </p:stCondLst>
+                                  <p:childTnLst>
+                                    <p:set>
+                                      <p:cBhvr>
+                                        <p:cTn id="26" dur="1" fill="hold">
+                                          <p:stCondLst>
+                                            <p:cond delay="0"/>
+                                          </p:stCondLst>
+                                        </p:cTn>
+                                        <p:tgtEl>
+                                          <p:spTgt spid="3">
+                                            <p:txEl>
+                                              <p:pRg st="4" end="4"/>
+                                            </p:txEl>
+                                          </p:spTgt>
+                                        </p:tgtEl>
+                                        <p:attrNameLst>
+                                          <p:attrName>style.visibility</p:attrName>
+                                        </p:attrNameLst>
+                                      </p:cBhvr>
+                                      <p:to>
+                                        <p:strVal val="visible"/>
+                                      </p:to>
+                                    </p:set>
+                                    <p:animEffect transition="in" filter="fade">
+                                      <p:cBhvr>
+                                        <p:cTn id="27" dur="500"/>
+                                        <p:tgtEl>
+                                          <p:spTgt spid="3">
+                                            <p:txEl>
+                                              <p:pRg st="4" end="4"/>
+                                            </p:txEl>
+                                          </p:spTgt>
+                                        </p:tgtEl>
+                                      </p:cBhvr>
+                                    </p:animEffect>
+                                  </p:childTnLst>
+                                </p:cTn>
+                              </p:par>
+                            </p:childTnLst>
+                          </p:cTn>
+                        </p:par>
+                      </p:childTnLst>
+                    </p:cTn>
+                  </p:par>
+                </p:childTnLst>
+              </p:cTn>
+              <p:prevCondLst>
+                <p:cond evt="onPrev" delay="0">
+                  <p:tgtEl>
+                    <p:sldTgt/>
+                  </p:tgtEl>
+                </p:cond>
+              </p:prevCondLst>
+              <p:nextCondLst>
+                <p:cond evt="onNext" delay="0">
+                  <p:tgtEl>
+                    <p:sldTgt/>
+                  </p:tgtEl>
+                </p:cond>
+              </p:nextCondLst>
+            </p:seq>
+          </p:childTnLst>
+        </p:cTn>
+      </p:par>
+    </p:tnLst>
+    <p:bldLst>
+      <p:bldP spid="3" grpId="0" build="p"/>
+    </p:bldLst>
+  </p:timing>
+</p:sld>
+</file>
+
+<file path=ppt/slides/slide12.xml><?xml version="1.0" encoding="utf-8"?>
+<p:sld xmlns:a="http://schemas.openxmlformats.org/drawingml/2006/main" xmlns:r="http://schemas.openxmlformats.org/officeDocument/2006/relationships" xmlns:p="http://schemas.openxmlformats.org/presentationml/2006/main">
+  <p:cSld>
+    <p:spTree>
+      <p:nvGrpSpPr>
+        <p:cNvPr id="1" name=""/>
+        <p:cNvGrpSpPr/>
+        <p:nvPr/>
+      </p:nvGrpSpPr>
+      <p:grpSpPr>
+        <a:xfrm>
+          <a:off x="0" y="0"/>
+          <a:ext cx="0" cy="0"/>
+          <a:chOff x="0" y="0"/>
+          <a:chExt cx="0" cy="0"/>
+        </a:xfrm>
+      </p:grpSpPr>
+      <p:sp>
+        <p:nvSpPr>
+          <p:cNvPr id="12" name="Rectangle 11">
+            <a:extLst>
+              <a:ext uri="{FF2B5EF4-FFF2-40B4-BE49-F238E27FC236}">
+                <a16:creationId xmlns:a16="http://schemas.microsoft.com/office/drawing/2014/main" id="{E6965792-35C8-476C-823B-425804EAF515}"/>
+              </a:ext>
+            </a:extLst>
+          </p:cNvPr>
+          <p:cNvSpPr/>
+          <p:nvPr/>
+        </p:nvSpPr>
+        <p:spPr>
+          <a:xfrm>
+            <a:off x="0" y="0"/>
+            <a:ext cx="9915525" cy="6858000"/>
+          </a:xfrm>
+          <a:prstGeom prst="rect">
+            <a:avLst/>
+          </a:prstGeom>
+          <a:solidFill>
+            <a:schemeClr val="accent3">
+              <a:alpha val="85000"/>
+            </a:schemeClr>
+          </a:solidFill>
+          <a:ln>
+            <a:noFill/>
+          </a:ln>
+        </p:spPr>
+        <p:style>
+          <a:lnRef idx="2">
+            <a:schemeClr val="accent1">
+              <a:shade val="50000"/>
+            </a:schemeClr>
+          </a:lnRef>
+          <a:fillRef idx="1">
+            <a:schemeClr val="accent1"/>
+          </a:fillRef>
+          <a:effectRef idx="0">
+            <a:schemeClr val="accent1"/>
+          </a:effectRef>
+          <a:fontRef idx="minor">
+            <a:schemeClr val="lt1"/>
+          </a:fontRef>
+        </p:style>
+        <p:txBody>
+          <a:bodyPr rtlCol="0" anchor="ctr"/>
+          <a:lstStyle/>
+          <a:p>
+            <a:pPr algn="ctr"/>
+            <a:endParaRPr lang="en-US"/>
+          </a:p>
+        </p:txBody>
+      </p:sp>
+      <p:sp>
+        <p:nvSpPr>
+          <p:cNvPr id="130" name="Freeform: Shape 129">
+            <a:extLst>
+              <a:ext uri="{FF2B5EF4-FFF2-40B4-BE49-F238E27FC236}">
+                <a16:creationId xmlns:a16="http://schemas.microsoft.com/office/drawing/2014/main" id="{1BD84AF7-A16C-4866-B41C-BD870FF33EE0}"/>
+              </a:ext>
+            </a:extLst>
+          </p:cNvPr>
+          <p:cNvSpPr/>
+          <p:nvPr userDrawn="1"/>
+        </p:nvSpPr>
+        <p:spPr>
+          <a:xfrm>
+            <a:off x="4916844" y="0"/>
+            <a:ext cx="7275156" cy="6858000"/>
+          </a:xfrm>
+          <a:custGeom>
+            <a:avLst/>
+            <a:gdLst>
+              <a:gd name="connsiteX0" fmla="*/ 4124200 w 7275156"/>
+              <a:gd name="connsiteY0" fmla="*/ 0 h 6857999"/>
+              <a:gd name="connsiteX1" fmla="*/ 7275156 w 7275156"/>
+              <a:gd name="connsiteY1" fmla="*/ 0 h 6857999"/>
+              <a:gd name="connsiteX2" fmla="*/ 7275156 w 7275156"/>
+              <a:gd name="connsiteY2" fmla="*/ 6857999 h 6857999"/>
+              <a:gd name="connsiteX3" fmla="*/ 89795 w 7275156"/>
+              <a:gd name="connsiteY3" fmla="*/ 6857999 h 6857999"/>
+              <a:gd name="connsiteX4" fmla="*/ 80764 w 7275156"/>
+              <a:gd name="connsiteY4" fmla="*/ 6822877 h 6857999"/>
+              <a:gd name="connsiteX5" fmla="*/ 0 w 7275156"/>
+              <a:gd name="connsiteY5" fmla="*/ 6021716 h 6857999"/>
+              <a:gd name="connsiteX6" fmla="*/ 2981808 w 7275156"/>
+              <a:gd name="connsiteY6" fmla="*/ 2171572 h 6857999"/>
+              <a:gd name="connsiteX7" fmla="*/ 3159799 w 7275156"/>
+              <a:gd name="connsiteY7" fmla="*/ 2130492 h 6857999"/>
+              <a:gd name="connsiteX8" fmla="*/ 3173670 w 7275156"/>
+              <a:gd name="connsiteY8" fmla="*/ 2021333 h 6857999"/>
+              <a:gd name="connsiteX9" fmla="*/ 4020494 w 7275156"/>
+              <a:gd name="connsiteY9" fmla="*/ 116526 h 6857999"/>
+            </a:gdLst>
+            <a:ahLst/>
+            <a:cxnLst>
+              <a:cxn ang="0">
+                <a:pos x="connsiteX0" y="connsiteY0"/>
+              </a:cxn>
+              <a:cxn ang="0">
+                <a:pos x="connsiteX1" y="connsiteY1"/>
+              </a:cxn>
+              <a:cxn ang="0">
+                <a:pos x="connsiteX2" y="connsiteY2"/>
+              </a:cxn>
+              <a:cxn ang="0">
+                <a:pos x="connsiteX3" y="connsiteY3"/>
+              </a:cxn>
+              <a:cxn ang="0">
+                <a:pos x="connsiteX4" y="connsiteY4"/>
+              </a:cxn>
+              <a:cxn ang="0">
+                <a:pos x="connsiteX5" y="connsiteY5"/>
+              </a:cxn>
+              <a:cxn ang="0">
+                <a:pos x="connsiteX6" y="connsiteY6"/>
+              </a:cxn>
+              <a:cxn ang="0">
+                <a:pos x="connsiteX7" y="connsiteY7"/>
+              </a:cxn>
+              <a:cxn ang="0">
+                <a:pos x="connsiteX8" y="connsiteY8"/>
+              </a:cxn>
+              <a:cxn ang="0">
+                <a:pos x="connsiteX9" y="connsiteY9"/>
+              </a:cxn>
+            </a:cxnLst>
+            <a:rect l="l" t="t" r="r" b="b"/>
+            <a:pathLst>
+              <a:path w="7275156" h="6857999">
+                <a:moveTo>
+                  <a:pt x="4124200" y="0"/>
+                </a:moveTo>
+                <a:lnTo>
+                  <a:pt x="7275156" y="0"/>
+                </a:lnTo>
+                <a:lnTo>
+                  <a:pt x="7275156" y="6857999"/>
+                </a:lnTo>
+                <a:lnTo>
+                  <a:pt x="89795" y="6857999"/>
+                </a:lnTo>
+                <a:lnTo>
+                  <a:pt x="80764" y="6822877"/>
+                </a:lnTo>
+                <a:cubicBezTo>
+                  <a:pt x="27810" y="6564095"/>
+                  <a:pt x="0" y="6296153"/>
+                  <a:pt x="0" y="6021716"/>
+                </a:cubicBezTo>
+                <a:cubicBezTo>
+                  <a:pt x="0" y="4169267"/>
+                  <a:pt x="1267066" y="2612756"/>
+                  <a:pt x="2981808" y="2171572"/>
+                </a:cubicBezTo>
+                <a:lnTo>
+                  <a:pt x="3159799" y="2130492"/>
+                </a:lnTo>
+                <a:lnTo>
+                  <a:pt x="3173670" y="2021333"/>
+                </a:lnTo>
+                <a:cubicBezTo>
+                  <a:pt x="3283006" y="1305770"/>
+                  <a:pt x="3583127" y="652987"/>
+                  <a:pt x="4020494" y="116526"/>
+                </a:cubicBezTo>
+                <a:close/>
+              </a:path>
+            </a:pathLst>
+          </a:custGeom>
+          <a:solidFill>
+            <a:schemeClr val="accent2"/>
+          </a:solidFill>
+          <a:ln>
+            <a:noFill/>
+          </a:ln>
+        </p:spPr>
+        <p:style>
+          <a:lnRef idx="2">
+            <a:schemeClr val="accent1">
+              <a:shade val="50000"/>
+            </a:schemeClr>
+          </a:lnRef>
+          <a:fillRef idx="1">
+            <a:schemeClr val="accent1"/>
+          </a:fillRef>
+          <a:effectRef idx="0">
+            <a:schemeClr val="accent1"/>
+          </a:effectRef>
+          <a:fontRef idx="minor">
+            <a:schemeClr val="lt1"/>
+          </a:fontRef>
+        </p:style>
+        <p:txBody>
+          <a:bodyPr wrap="square" rtlCol="0" anchor="ctr">
+            <a:noAutofit/>
+          </a:bodyPr>
+          <a:lstStyle/>
+          <a:p>
+            <a:pPr algn="ctr"/>
+            <a:endParaRPr lang="en-US"/>
+          </a:p>
+        </p:txBody>
+      </p:sp>
+      <p:sp>
+        <p:nvSpPr>
+          <p:cNvPr id="2" name="TextBox 1">
+            <a:extLst>
+              <a:ext uri="{FF2B5EF4-FFF2-40B4-BE49-F238E27FC236}">
+                <a16:creationId xmlns:a16="http://schemas.microsoft.com/office/drawing/2014/main" id="{5111AFE2-CC0D-4E71-DF91-97FC0F66ADF8}"/>
+              </a:ext>
+            </a:extLst>
+          </p:cNvPr>
+          <p:cNvSpPr txBox="1"/>
+          <p:nvPr/>
+        </p:nvSpPr>
+        <p:spPr>
+          <a:xfrm>
+            <a:off x="6400801" y="3476685"/>
+            <a:ext cx="4901312" cy="830997"/>
+          </a:xfrm>
+          <a:prstGeom prst="rect">
+            <a:avLst/>
+          </a:prstGeom>
+          <a:noFill/>
+        </p:spPr>
+        <p:txBody>
+          <a:bodyPr wrap="square" rtlCol="0">
+            <a:spAutoFit/>
+          </a:bodyPr>
+          <a:lstStyle/>
+          <a:p>
+            <a:pPr algn="r"/>
+            <a:r>
+              <a:rPr lang="en-US" sz="4800" b="1">
+                <a:solidFill>
+                  <a:schemeClr val="bg1"/>
+                </a:solidFill>
+                <a:latin typeface="Open Sans" panose="020B0606030504020204" pitchFamily="34" charset="0"/>
+                <a:ea typeface="Open Sans" panose="020B0606030504020204" pitchFamily="34" charset="0"/>
+                <a:cs typeface="Open Sans" panose="020B0606030504020204" pitchFamily="34" charset="0"/>
+              </a:rPr>
+              <a:t>Faleminderit!</a:t>
+            </a:r>
+            <a:endParaRPr lang="en-US" sz="4800" b="1" dirty="0">
+              <a:solidFill>
+                <a:schemeClr val="bg1"/>
+              </a:solidFill>
+              <a:latin typeface="Open Sans" panose="020B0606030504020204" pitchFamily="34" charset="0"/>
+              <a:ea typeface="Open Sans" panose="020B0606030504020204" pitchFamily="34" charset="0"/>
+              <a:cs typeface="Open Sans" panose="020B0606030504020204" pitchFamily="34" charset="0"/>
+            </a:endParaRPr>
+          </a:p>
+        </p:txBody>
+      </p:sp>
+    </p:spTree>
+    <p:extLst>
+      <p:ext uri="{BB962C8B-B14F-4D97-AF65-F5344CB8AC3E}">
+        <p14:creationId xmlns:p14="http://schemas.microsoft.com/office/powerpoint/2010/main" val="2920818008"/>
       </p:ext>
     </p:extLst>
   </p:cSld>
@@ -11111,10 +13025,10 @@
       </p:grpSpPr>
       <p:sp>
         <p:nvSpPr>
-          <p:cNvPr id="12" name="Rectangle 11">
-            <a:extLst>
-              <a:ext uri="{FF2B5EF4-FFF2-40B4-BE49-F238E27FC236}">
-                <a16:creationId xmlns:a16="http://schemas.microsoft.com/office/drawing/2014/main" id="{E6965792-35C8-476C-823B-425804EAF515}"/>
+          <p:cNvPr id="22" name="Rectangle 21">
+            <a:extLst>
+              <a:ext uri="{FF2B5EF4-FFF2-40B4-BE49-F238E27FC236}">
+                <a16:creationId xmlns:a16="http://schemas.microsoft.com/office/drawing/2014/main" id="{422D24B8-5366-4F60-8DB7-03104991E720}"/>
               </a:ext>
             </a:extLst>
           </p:cNvPr>
@@ -11124,15 +13038,13 @@
         <p:spPr>
           <a:xfrm>
             <a:off x="0" y="0"/>
-            <a:ext cx="9915525" cy="6858000"/>
+            <a:ext cx="12192000" cy="227974"/>
           </a:xfrm>
           <a:prstGeom prst="rect">
             <a:avLst/>
           </a:prstGeom>
           <a:solidFill>
-            <a:schemeClr val="accent3">
-              <a:alpha val="85000"/>
-            </a:schemeClr>
+            <a:schemeClr val="accent2"/>
           </a:solidFill>
           <a:ln>
             <a:noFill/>
@@ -11165,123 +13077,26 @@
       </p:sp>
       <p:sp>
         <p:nvSpPr>
-          <p:cNvPr id="130" name="Freeform: Shape 129">
-            <a:extLst>
-              <a:ext uri="{FF2B5EF4-FFF2-40B4-BE49-F238E27FC236}">
-                <a16:creationId xmlns:a16="http://schemas.microsoft.com/office/drawing/2014/main" id="{1BD84AF7-A16C-4866-B41C-BD870FF33EE0}"/>
+          <p:cNvPr id="23" name="Rectangle 22">
+            <a:extLst>
+              <a:ext uri="{FF2B5EF4-FFF2-40B4-BE49-F238E27FC236}">
+                <a16:creationId xmlns:a16="http://schemas.microsoft.com/office/drawing/2014/main" id="{C0C70AF6-E364-4E39-8702-38BDB2AB6A60}"/>
               </a:ext>
             </a:extLst>
           </p:cNvPr>
           <p:cNvSpPr/>
-          <p:nvPr userDrawn="1"/>
+          <p:nvPr/>
         </p:nvSpPr>
         <p:spPr>
           <a:xfrm>
-            <a:off x="4916844" y="0"/>
-            <a:ext cx="7275156" cy="6858000"/>
+            <a:off x="0" y="6635788"/>
+            <a:ext cx="12192000" cy="227974"/>
           </a:xfrm>
-          <a:custGeom>
+          <a:prstGeom prst="rect">
             <a:avLst/>
-            <a:gdLst>
-              <a:gd name="connsiteX0" fmla="*/ 4124200 w 7275156"/>
-              <a:gd name="connsiteY0" fmla="*/ 0 h 6857999"/>
-              <a:gd name="connsiteX1" fmla="*/ 7275156 w 7275156"/>
-              <a:gd name="connsiteY1" fmla="*/ 0 h 6857999"/>
-              <a:gd name="connsiteX2" fmla="*/ 7275156 w 7275156"/>
-              <a:gd name="connsiteY2" fmla="*/ 6857999 h 6857999"/>
-              <a:gd name="connsiteX3" fmla="*/ 89795 w 7275156"/>
-              <a:gd name="connsiteY3" fmla="*/ 6857999 h 6857999"/>
-              <a:gd name="connsiteX4" fmla="*/ 80764 w 7275156"/>
-              <a:gd name="connsiteY4" fmla="*/ 6822877 h 6857999"/>
-              <a:gd name="connsiteX5" fmla="*/ 0 w 7275156"/>
-              <a:gd name="connsiteY5" fmla="*/ 6021716 h 6857999"/>
-              <a:gd name="connsiteX6" fmla="*/ 2981808 w 7275156"/>
-              <a:gd name="connsiteY6" fmla="*/ 2171572 h 6857999"/>
-              <a:gd name="connsiteX7" fmla="*/ 3159799 w 7275156"/>
-              <a:gd name="connsiteY7" fmla="*/ 2130492 h 6857999"/>
-              <a:gd name="connsiteX8" fmla="*/ 3173670 w 7275156"/>
-              <a:gd name="connsiteY8" fmla="*/ 2021333 h 6857999"/>
-              <a:gd name="connsiteX9" fmla="*/ 4020494 w 7275156"/>
-              <a:gd name="connsiteY9" fmla="*/ 116526 h 6857999"/>
-            </a:gdLst>
-            <a:ahLst/>
-            <a:cxnLst>
-              <a:cxn ang="0">
-                <a:pos x="connsiteX0" y="connsiteY0"/>
-              </a:cxn>
-              <a:cxn ang="0">
-                <a:pos x="connsiteX1" y="connsiteY1"/>
-              </a:cxn>
-              <a:cxn ang="0">
-                <a:pos x="connsiteX2" y="connsiteY2"/>
-              </a:cxn>
-              <a:cxn ang="0">
-                <a:pos x="connsiteX3" y="connsiteY3"/>
-              </a:cxn>
-              <a:cxn ang="0">
-                <a:pos x="connsiteX4" y="connsiteY4"/>
-              </a:cxn>
-              <a:cxn ang="0">
-                <a:pos x="connsiteX5" y="connsiteY5"/>
-              </a:cxn>
-              <a:cxn ang="0">
-                <a:pos x="connsiteX6" y="connsiteY6"/>
-              </a:cxn>
-              <a:cxn ang="0">
-                <a:pos x="connsiteX7" y="connsiteY7"/>
-              </a:cxn>
-              <a:cxn ang="0">
-                <a:pos x="connsiteX8" y="connsiteY8"/>
-              </a:cxn>
-              <a:cxn ang="0">
-                <a:pos x="connsiteX9" y="connsiteY9"/>
-              </a:cxn>
-            </a:cxnLst>
-            <a:rect l="l" t="t" r="r" b="b"/>
-            <a:pathLst>
-              <a:path w="7275156" h="6857999">
-                <a:moveTo>
-                  <a:pt x="4124200" y="0"/>
-                </a:moveTo>
-                <a:lnTo>
-                  <a:pt x="7275156" y="0"/>
-                </a:lnTo>
-                <a:lnTo>
-                  <a:pt x="7275156" y="6857999"/>
-                </a:lnTo>
-                <a:lnTo>
-                  <a:pt x="89795" y="6857999"/>
-                </a:lnTo>
-                <a:lnTo>
-                  <a:pt x="80764" y="6822877"/>
-                </a:lnTo>
-                <a:cubicBezTo>
-                  <a:pt x="27810" y="6564095"/>
-                  <a:pt x="0" y="6296153"/>
-                  <a:pt x="0" y="6021716"/>
-                </a:cubicBezTo>
-                <a:cubicBezTo>
-                  <a:pt x="0" y="4169267"/>
-                  <a:pt x="1267066" y="2612756"/>
-                  <a:pt x="2981808" y="2171572"/>
-                </a:cubicBezTo>
-                <a:lnTo>
-                  <a:pt x="3159799" y="2130492"/>
-                </a:lnTo>
-                <a:lnTo>
-                  <a:pt x="3173670" y="2021333"/>
-                </a:lnTo>
-                <a:cubicBezTo>
-                  <a:pt x="3283006" y="1305770"/>
-                  <a:pt x="3583127" y="652987"/>
-                  <a:pt x="4020494" y="116526"/>
-                </a:cubicBezTo>
-                <a:close/>
-              </a:path>
-            </a:pathLst>
-          </a:custGeom>
+          </a:prstGeom>
           <a:solidFill>
-            <a:schemeClr val="accent2"/>
+            <a:schemeClr val="accent3"/>
           </a:solidFill>
           <a:ln>
             <a:noFill/>
@@ -11304,9 +13119,7 @@
           </a:fontRef>
         </p:style>
         <p:txBody>
-          <a:bodyPr wrap="square" rtlCol="0" anchor="ctr">
-            <a:noAutofit/>
-          </a:bodyPr>
+          <a:bodyPr rtlCol="0" anchor="ctr"/>
           <a:lstStyle/>
           <a:p>
             <a:pPr algn="ctr"/>
@@ -11319,7 +13132,7 @@
           <p:cNvPr id="2" name="TextBox 1">
             <a:extLst>
               <a:ext uri="{FF2B5EF4-FFF2-40B4-BE49-F238E27FC236}">
-                <a16:creationId xmlns:a16="http://schemas.microsoft.com/office/drawing/2014/main" id="{5111AFE2-CC0D-4E71-DF91-97FC0F66ADF8}"/>
+                <a16:creationId xmlns:a16="http://schemas.microsoft.com/office/drawing/2014/main" id="{E71E8B74-100F-C808-9EBF-26AB09D35616}"/>
               </a:ext>
             </a:extLst>
           </p:cNvPr>
@@ -11328,8 +13141,8 @@
         </p:nvSpPr>
         <p:spPr>
           <a:xfrm>
-            <a:off x="6400801" y="3476685"/>
-            <a:ext cx="4901312" cy="830997"/>
+            <a:off x="2525870" y="564169"/>
+            <a:ext cx="7140259" cy="769441"/>
           </a:xfrm>
           <a:prstGeom prst="rect">
             <a:avLst/>
@@ -11342,33 +13155,317 @@
           </a:bodyPr>
           <a:lstStyle/>
           <a:p>
-            <a:pPr algn="r"/>
-            <a:r>
-              <a:rPr lang="en-US" sz="4800" b="1">
+            <a:pPr algn="ctr"/>
+            <a:r>
+              <a:rPr lang="en-US" sz="4400" b="1" dirty="0">
                 <a:solidFill>
-                  <a:schemeClr val="bg1"/>
+                  <a:schemeClr val="accent2"/>
                 </a:solidFill>
                 <a:latin typeface="Open Sans" panose="020B0606030504020204" pitchFamily="34" charset="0"/>
                 <a:ea typeface="Open Sans" panose="020B0606030504020204" pitchFamily="34" charset="0"/>
                 <a:cs typeface="Open Sans" panose="020B0606030504020204" pitchFamily="34" charset="0"/>
               </a:rPr>
-              <a:t>Faleminderit!</a:t>
-            </a:r>
-            <a:endParaRPr lang="en-US" sz="4800" b="1" dirty="0">
-              <a:solidFill>
-                <a:schemeClr val="bg1"/>
-              </a:solidFill>
-              <a:latin typeface="Open Sans" panose="020B0606030504020204" pitchFamily="34" charset="0"/>
-              <a:ea typeface="Open Sans" panose="020B0606030504020204" pitchFamily="34" charset="0"/>
-              <a:cs typeface="Open Sans" panose="020B0606030504020204" pitchFamily="34" charset="0"/>
-            </a:endParaRPr>
+              <a:t>Day 1</a:t>
+            </a:r>
+          </a:p>
+        </p:txBody>
+      </p:sp>
+      <p:sp>
+        <p:nvSpPr>
+          <p:cNvPr id="3" name="Content Placeholder 2">
+            <a:extLst>
+              <a:ext uri="{FF2B5EF4-FFF2-40B4-BE49-F238E27FC236}">
+                <a16:creationId xmlns:a16="http://schemas.microsoft.com/office/drawing/2014/main" id="{87233FFD-E4C9-921F-7359-86A2249FD4F3}"/>
+              </a:ext>
+            </a:extLst>
+          </p:cNvPr>
+          <p:cNvSpPr txBox="1">
+            <a:spLocks/>
+          </p:cNvSpPr>
+          <p:nvPr/>
+        </p:nvSpPr>
+        <p:spPr>
+          <a:xfrm>
+            <a:off x="713913" y="1577050"/>
+            <a:ext cx="10515600" cy="4351338"/>
+          </a:xfrm>
+          <a:prstGeom prst="rect">
+            <a:avLst/>
+          </a:prstGeom>
+        </p:spPr>
+        <p:txBody>
+          <a:bodyPr/>
+          <a:lstStyle>
+            <a:lvl1pPr marL="228600" indent="-228600" algn="l" defTabSz="914400" rtl="0" eaLnBrk="1" latinLnBrk="0" hangingPunct="1">
+              <a:lnSpc>
+                <a:spcPct val="90000"/>
+              </a:lnSpc>
+              <a:spcBef>
+                <a:spcPts val="1000"/>
+              </a:spcBef>
+              <a:buFont typeface="Arial" panose="020B0604020202020204" pitchFamily="34" charset="0"/>
+              <a:buChar char="•"/>
+              <a:defRPr sz="2800" kern="1200">
+                <a:solidFill>
+                  <a:schemeClr val="tx1"/>
+                </a:solidFill>
+                <a:latin typeface="+mn-lt"/>
+                <a:ea typeface="+mn-ea"/>
+                <a:cs typeface="+mn-cs"/>
+              </a:defRPr>
+            </a:lvl1pPr>
+            <a:lvl2pPr marL="685800" indent="-228600" algn="l" defTabSz="914400" rtl="0" eaLnBrk="1" latinLnBrk="0" hangingPunct="1">
+              <a:lnSpc>
+                <a:spcPct val="90000"/>
+              </a:lnSpc>
+              <a:spcBef>
+                <a:spcPts val="500"/>
+              </a:spcBef>
+              <a:buFont typeface="Arial" panose="020B0604020202020204" pitchFamily="34" charset="0"/>
+              <a:buChar char="•"/>
+              <a:defRPr sz="2400" kern="1200">
+                <a:solidFill>
+                  <a:schemeClr val="tx1"/>
+                </a:solidFill>
+                <a:latin typeface="+mn-lt"/>
+                <a:ea typeface="+mn-ea"/>
+                <a:cs typeface="+mn-cs"/>
+              </a:defRPr>
+            </a:lvl2pPr>
+            <a:lvl3pPr marL="1143000" indent="-228600" algn="l" defTabSz="914400" rtl="0" eaLnBrk="1" latinLnBrk="0" hangingPunct="1">
+              <a:lnSpc>
+                <a:spcPct val="90000"/>
+              </a:lnSpc>
+              <a:spcBef>
+                <a:spcPts val="500"/>
+              </a:spcBef>
+              <a:buFont typeface="Arial" panose="020B0604020202020204" pitchFamily="34" charset="0"/>
+              <a:buChar char="•"/>
+              <a:defRPr sz="2000" kern="1200">
+                <a:solidFill>
+                  <a:schemeClr val="tx1"/>
+                </a:solidFill>
+                <a:latin typeface="+mn-lt"/>
+                <a:ea typeface="+mn-ea"/>
+                <a:cs typeface="+mn-cs"/>
+              </a:defRPr>
+            </a:lvl3pPr>
+            <a:lvl4pPr marL="1600200" indent="-228600" algn="l" defTabSz="914400" rtl="0" eaLnBrk="1" latinLnBrk="0" hangingPunct="1">
+              <a:lnSpc>
+                <a:spcPct val="90000"/>
+              </a:lnSpc>
+              <a:spcBef>
+                <a:spcPts val="500"/>
+              </a:spcBef>
+              <a:buFont typeface="Arial" panose="020B0604020202020204" pitchFamily="34" charset="0"/>
+              <a:buChar char="•"/>
+              <a:defRPr sz="1800" kern="1200">
+                <a:solidFill>
+                  <a:schemeClr val="tx1"/>
+                </a:solidFill>
+                <a:latin typeface="+mn-lt"/>
+                <a:ea typeface="+mn-ea"/>
+                <a:cs typeface="+mn-cs"/>
+              </a:defRPr>
+            </a:lvl4pPr>
+            <a:lvl5pPr marL="2057400" indent="-228600" algn="l" defTabSz="914400" rtl="0" eaLnBrk="1" latinLnBrk="0" hangingPunct="1">
+              <a:lnSpc>
+                <a:spcPct val="90000"/>
+              </a:lnSpc>
+              <a:spcBef>
+                <a:spcPts val="500"/>
+              </a:spcBef>
+              <a:buFont typeface="Arial" panose="020B0604020202020204" pitchFamily="34" charset="0"/>
+              <a:buChar char="•"/>
+              <a:defRPr sz="1800" kern="1200">
+                <a:solidFill>
+                  <a:schemeClr val="tx1"/>
+                </a:solidFill>
+                <a:latin typeface="+mn-lt"/>
+                <a:ea typeface="+mn-ea"/>
+                <a:cs typeface="+mn-cs"/>
+              </a:defRPr>
+            </a:lvl5pPr>
+            <a:lvl6pPr marL="2514600" indent="-228600" algn="l" defTabSz="914400" rtl="0" eaLnBrk="1" latinLnBrk="0" hangingPunct="1">
+              <a:lnSpc>
+                <a:spcPct val="90000"/>
+              </a:lnSpc>
+              <a:spcBef>
+                <a:spcPts val="500"/>
+              </a:spcBef>
+              <a:buFont typeface="Arial" panose="020B0604020202020204" pitchFamily="34" charset="0"/>
+              <a:buChar char="•"/>
+              <a:defRPr sz="1800" kern="1200">
+                <a:solidFill>
+                  <a:schemeClr val="tx1"/>
+                </a:solidFill>
+                <a:latin typeface="+mn-lt"/>
+                <a:ea typeface="+mn-ea"/>
+                <a:cs typeface="+mn-cs"/>
+              </a:defRPr>
+            </a:lvl6pPr>
+            <a:lvl7pPr marL="2971800" indent="-228600" algn="l" defTabSz="914400" rtl="0" eaLnBrk="1" latinLnBrk="0" hangingPunct="1">
+              <a:lnSpc>
+                <a:spcPct val="90000"/>
+              </a:lnSpc>
+              <a:spcBef>
+                <a:spcPts val="500"/>
+              </a:spcBef>
+              <a:buFont typeface="Arial" panose="020B0604020202020204" pitchFamily="34" charset="0"/>
+              <a:buChar char="•"/>
+              <a:defRPr sz="1800" kern="1200">
+                <a:solidFill>
+                  <a:schemeClr val="tx1"/>
+                </a:solidFill>
+                <a:latin typeface="+mn-lt"/>
+                <a:ea typeface="+mn-ea"/>
+                <a:cs typeface="+mn-cs"/>
+              </a:defRPr>
+            </a:lvl7pPr>
+            <a:lvl8pPr marL="3429000" indent="-228600" algn="l" defTabSz="914400" rtl="0" eaLnBrk="1" latinLnBrk="0" hangingPunct="1">
+              <a:lnSpc>
+                <a:spcPct val="90000"/>
+              </a:lnSpc>
+              <a:spcBef>
+                <a:spcPts val="500"/>
+              </a:spcBef>
+              <a:buFont typeface="Arial" panose="020B0604020202020204" pitchFamily="34" charset="0"/>
+              <a:buChar char="•"/>
+              <a:defRPr sz="1800" kern="1200">
+                <a:solidFill>
+                  <a:schemeClr val="tx1"/>
+                </a:solidFill>
+                <a:latin typeface="+mn-lt"/>
+                <a:ea typeface="+mn-ea"/>
+                <a:cs typeface="+mn-cs"/>
+              </a:defRPr>
+            </a:lvl8pPr>
+            <a:lvl9pPr marL="3886200" indent="-228600" algn="l" defTabSz="914400" rtl="0" eaLnBrk="1" latinLnBrk="0" hangingPunct="1">
+              <a:lnSpc>
+                <a:spcPct val="90000"/>
+              </a:lnSpc>
+              <a:spcBef>
+                <a:spcPts val="500"/>
+              </a:spcBef>
+              <a:buFont typeface="Arial" panose="020B0604020202020204" pitchFamily="34" charset="0"/>
+              <a:buChar char="•"/>
+              <a:defRPr sz="1800" kern="1200">
+                <a:solidFill>
+                  <a:schemeClr val="tx1"/>
+                </a:solidFill>
+                <a:latin typeface="+mn-lt"/>
+                <a:ea typeface="+mn-ea"/>
+                <a:cs typeface="+mn-cs"/>
+              </a:defRPr>
+            </a:lvl9pPr>
+          </a:lstStyle>
+          <a:p>
+            <a:pPr>
+              <a:buFont typeface="Courier New" panose="02070309020205020404" pitchFamily="49" charset="0"/>
+              <a:buChar char="o"/>
+            </a:pPr>
+            <a:r>
+              <a:rPr lang="en-US" dirty="0"/>
+              <a:t>Console App with Entity Framework</a:t>
+            </a:r>
+          </a:p>
+          <a:p>
+            <a:pPr>
+              <a:buFont typeface="Courier New" panose="02070309020205020404" pitchFamily="49" charset="0"/>
+              <a:buChar char="o"/>
+            </a:pPr>
+            <a:r>
+              <a:rPr lang="en-US" dirty="0"/>
+              <a:t>MVC App with Entity Framework</a:t>
+            </a:r>
+          </a:p>
+          <a:p>
+            <a:pPr>
+              <a:buFont typeface="Courier New" panose="02070309020205020404" pitchFamily="49" charset="0"/>
+              <a:buChar char="o"/>
+            </a:pPr>
+            <a:r>
+              <a:rPr lang="en-US" dirty="0" err="1"/>
+              <a:t>DbContext</a:t>
+            </a:r>
+            <a:r>
+              <a:rPr lang="en-US" dirty="0"/>
+              <a:t> &amp; </a:t>
+            </a:r>
+            <a:r>
+              <a:rPr lang="en-US" dirty="0" err="1"/>
+              <a:t>DbSet</a:t>
+            </a:r>
+            <a:endParaRPr lang="en-US" dirty="0"/>
+          </a:p>
+          <a:p>
+            <a:pPr>
+              <a:buFont typeface="Courier New" panose="02070309020205020404" pitchFamily="49" charset="0"/>
+              <a:buChar char="o"/>
+            </a:pPr>
+            <a:r>
+              <a:rPr lang="en-US" dirty="0"/>
+              <a:t>Simple Data Modeling</a:t>
+            </a:r>
+          </a:p>
+          <a:p>
+            <a:pPr>
+              <a:buFont typeface="Courier New" panose="02070309020205020404" pitchFamily="49" charset="0"/>
+              <a:buChar char="o"/>
+            </a:pPr>
+            <a:r>
+              <a:rPr lang="en-US" dirty="0" err="1"/>
+              <a:t>FluentAPI</a:t>
+            </a:r>
+            <a:r>
+              <a:rPr lang="en-US" dirty="0"/>
+              <a:t>, </a:t>
+            </a:r>
+            <a:r>
+              <a:rPr lang="en-US" dirty="0" err="1"/>
+              <a:t>DataAnnotations</a:t>
+            </a:r>
+            <a:r>
+              <a:rPr lang="en-US" dirty="0"/>
+              <a:t>, Naming Conventions</a:t>
+            </a:r>
+          </a:p>
+          <a:p>
+            <a:pPr>
+              <a:buFont typeface="Courier New" panose="02070309020205020404" pitchFamily="49" charset="0"/>
+              <a:buChar char="o"/>
+            </a:pPr>
+            <a:r>
+              <a:rPr lang="en-US" dirty="0"/>
+              <a:t>Scaffolding an Existing Database</a:t>
+            </a:r>
+          </a:p>
+          <a:p>
+            <a:pPr>
+              <a:buFont typeface="Courier New" panose="02070309020205020404" pitchFamily="49" charset="0"/>
+              <a:buChar char="o"/>
+            </a:pPr>
+            <a:r>
+              <a:rPr lang="en-US" dirty="0"/>
+              <a:t>EF Migrations</a:t>
+            </a:r>
+          </a:p>
+          <a:p>
+            <a:pPr>
+              <a:buFont typeface="Courier New" panose="02070309020205020404" pitchFamily="49" charset="0"/>
+              <a:buChar char="o"/>
+            </a:pPr>
+            <a:r>
+              <a:rPr lang="en-US" dirty="0"/>
+              <a:t>LINQ</a:t>
+            </a:r>
           </a:p>
         </p:txBody>
       </p:sp>
     </p:spTree>
     <p:extLst>
       <p:ext uri="{BB962C8B-B14F-4D97-AF65-F5344CB8AC3E}">
-        <p14:creationId xmlns:p14="http://schemas.microsoft.com/office/powerpoint/2010/main" val="2920818008"/>
+        <p14:creationId xmlns:p14="http://schemas.microsoft.com/office/powerpoint/2010/main" val="699412243"/>
       </p:ext>
     </p:extLst>
   </p:cSld>
@@ -11387,6 +13484,527 @@
       </p:transition>
     </mc:Fallback>
   </mc:AlternateContent>
+  <p:timing>
+    <p:tnLst>
+      <p:par>
+        <p:cTn id="1" dur="indefinite" restart="never" nodeType="tmRoot">
+          <p:childTnLst>
+            <p:seq concurrent="1" nextAc="seek">
+              <p:cTn id="2" dur="indefinite" nodeType="mainSeq">
+                <p:childTnLst>
+                  <p:par>
+                    <p:cTn id="3" fill="hold">
+                      <p:stCondLst>
+                        <p:cond delay="indefinite"/>
+                      </p:stCondLst>
+                      <p:childTnLst>
+                        <p:par>
+                          <p:cTn id="4" fill="hold">
+                            <p:stCondLst>
+                              <p:cond delay="0"/>
+                            </p:stCondLst>
+                            <p:childTnLst>
+                              <p:par>
+                                <p:cTn id="5" presetID="10" presetClass="entr" presetSubtype="0" fill="hold" grpId="0" nodeType="clickEffect">
+                                  <p:stCondLst>
+                                    <p:cond delay="0"/>
+                                  </p:stCondLst>
+                                  <p:childTnLst>
+                                    <p:set>
+                                      <p:cBhvr>
+                                        <p:cTn id="6" dur="1" fill="hold">
+                                          <p:stCondLst>
+                                            <p:cond delay="0"/>
+                                          </p:stCondLst>
+                                        </p:cTn>
+                                        <p:tgtEl>
+                                          <p:spTgt spid="3">
+                                            <p:txEl>
+                                              <p:pRg st="0" end="0"/>
+                                            </p:txEl>
+                                          </p:spTgt>
+                                        </p:tgtEl>
+                                        <p:attrNameLst>
+                                          <p:attrName>style.visibility</p:attrName>
+                                        </p:attrNameLst>
+                                      </p:cBhvr>
+                                      <p:to>
+                                        <p:strVal val="visible"/>
+                                      </p:to>
+                                    </p:set>
+                                    <p:animEffect transition="in" filter="fade">
+                                      <p:cBhvr>
+                                        <p:cTn id="7" dur="500"/>
+                                        <p:tgtEl>
+                                          <p:spTgt spid="3">
+                                            <p:txEl>
+                                              <p:pRg st="0" end="0"/>
+                                            </p:txEl>
+                                          </p:spTgt>
+                                        </p:tgtEl>
+                                      </p:cBhvr>
+                                    </p:animEffect>
+                                  </p:childTnLst>
+                                </p:cTn>
+                              </p:par>
+                            </p:childTnLst>
+                          </p:cTn>
+                        </p:par>
+                      </p:childTnLst>
+                    </p:cTn>
+                  </p:par>
+                  <p:par>
+                    <p:cTn id="8" fill="hold">
+                      <p:stCondLst>
+                        <p:cond delay="indefinite"/>
+                      </p:stCondLst>
+                      <p:childTnLst>
+                        <p:par>
+                          <p:cTn id="9" fill="hold">
+                            <p:stCondLst>
+                              <p:cond delay="0"/>
+                            </p:stCondLst>
+                            <p:childTnLst>
+                              <p:par>
+                                <p:cTn id="10" presetID="10" presetClass="entr" presetSubtype="0" fill="hold" grpId="0" nodeType="clickEffect">
+                                  <p:stCondLst>
+                                    <p:cond delay="0"/>
+                                  </p:stCondLst>
+                                  <p:childTnLst>
+                                    <p:set>
+                                      <p:cBhvr>
+                                        <p:cTn id="11" dur="1" fill="hold">
+                                          <p:stCondLst>
+                                            <p:cond delay="0"/>
+                                          </p:stCondLst>
+                                        </p:cTn>
+                                        <p:tgtEl>
+                                          <p:spTgt spid="3">
+                                            <p:txEl>
+                                              <p:pRg st="1" end="1"/>
+                                            </p:txEl>
+                                          </p:spTgt>
+                                        </p:tgtEl>
+                                        <p:attrNameLst>
+                                          <p:attrName>style.visibility</p:attrName>
+                                        </p:attrNameLst>
+                                      </p:cBhvr>
+                                      <p:to>
+                                        <p:strVal val="visible"/>
+                                      </p:to>
+                                    </p:set>
+                                    <p:animEffect transition="in" filter="fade">
+                                      <p:cBhvr>
+                                        <p:cTn id="12" dur="500"/>
+                                        <p:tgtEl>
+                                          <p:spTgt spid="3">
+                                            <p:txEl>
+                                              <p:pRg st="1" end="1"/>
+                                            </p:txEl>
+                                          </p:spTgt>
+                                        </p:tgtEl>
+                                      </p:cBhvr>
+                                    </p:animEffect>
+                                  </p:childTnLst>
+                                </p:cTn>
+                              </p:par>
+                            </p:childTnLst>
+                          </p:cTn>
+                        </p:par>
+                      </p:childTnLst>
+                    </p:cTn>
+                  </p:par>
+                  <p:par>
+                    <p:cTn id="13" fill="hold">
+                      <p:stCondLst>
+                        <p:cond delay="indefinite"/>
+                      </p:stCondLst>
+                      <p:childTnLst>
+                        <p:par>
+                          <p:cTn id="14" fill="hold">
+                            <p:stCondLst>
+                              <p:cond delay="0"/>
+                            </p:stCondLst>
+                            <p:childTnLst>
+                              <p:par>
+                                <p:cTn id="15" presetID="10" presetClass="entr" presetSubtype="0" fill="hold" grpId="0" nodeType="clickEffect">
+                                  <p:stCondLst>
+                                    <p:cond delay="0"/>
+                                  </p:stCondLst>
+                                  <p:childTnLst>
+                                    <p:set>
+                                      <p:cBhvr>
+                                        <p:cTn id="16" dur="1" fill="hold">
+                                          <p:stCondLst>
+                                            <p:cond delay="0"/>
+                                          </p:stCondLst>
+                                        </p:cTn>
+                                        <p:tgtEl>
+                                          <p:spTgt spid="3">
+                                            <p:txEl>
+                                              <p:pRg st="2" end="2"/>
+                                            </p:txEl>
+                                          </p:spTgt>
+                                        </p:tgtEl>
+                                        <p:attrNameLst>
+                                          <p:attrName>style.visibility</p:attrName>
+                                        </p:attrNameLst>
+                                      </p:cBhvr>
+                                      <p:to>
+                                        <p:strVal val="visible"/>
+                                      </p:to>
+                                    </p:set>
+                                    <p:animEffect transition="in" filter="fade">
+                                      <p:cBhvr>
+                                        <p:cTn id="17" dur="500"/>
+                                        <p:tgtEl>
+                                          <p:spTgt spid="3">
+                                            <p:txEl>
+                                              <p:pRg st="2" end="2"/>
+                                            </p:txEl>
+                                          </p:spTgt>
+                                        </p:tgtEl>
+                                      </p:cBhvr>
+                                    </p:animEffect>
+                                  </p:childTnLst>
+                                </p:cTn>
+                              </p:par>
+                            </p:childTnLst>
+                          </p:cTn>
+                        </p:par>
+                      </p:childTnLst>
+                    </p:cTn>
+                  </p:par>
+                  <p:par>
+                    <p:cTn id="18" fill="hold">
+                      <p:stCondLst>
+                        <p:cond delay="indefinite"/>
+                      </p:stCondLst>
+                      <p:childTnLst>
+                        <p:par>
+                          <p:cTn id="19" fill="hold">
+                            <p:stCondLst>
+                              <p:cond delay="0"/>
+                            </p:stCondLst>
+                            <p:childTnLst>
+                              <p:par>
+                                <p:cTn id="20" presetID="10" presetClass="entr" presetSubtype="0" fill="hold" grpId="0" nodeType="clickEffect">
+                                  <p:stCondLst>
+                                    <p:cond delay="0"/>
+                                  </p:stCondLst>
+                                  <p:childTnLst>
+                                    <p:set>
+                                      <p:cBhvr>
+                                        <p:cTn id="21" dur="1" fill="hold">
+                                          <p:stCondLst>
+                                            <p:cond delay="0"/>
+                                          </p:stCondLst>
+                                        </p:cTn>
+                                        <p:tgtEl>
+                                          <p:spTgt spid="3">
+                                            <p:txEl>
+                                              <p:pRg st="3" end="3"/>
+                                            </p:txEl>
+                                          </p:spTgt>
+                                        </p:tgtEl>
+                                        <p:attrNameLst>
+                                          <p:attrName>style.visibility</p:attrName>
+                                        </p:attrNameLst>
+                                      </p:cBhvr>
+                                      <p:to>
+                                        <p:strVal val="visible"/>
+                                      </p:to>
+                                    </p:set>
+                                    <p:animEffect transition="in" filter="fade">
+                                      <p:cBhvr>
+                                        <p:cTn id="22" dur="500"/>
+                                        <p:tgtEl>
+                                          <p:spTgt spid="3">
+                                            <p:txEl>
+                                              <p:pRg st="3" end="3"/>
+                                            </p:txEl>
+                                          </p:spTgt>
+                                        </p:tgtEl>
+                                      </p:cBhvr>
+                                    </p:animEffect>
+                                  </p:childTnLst>
+                                </p:cTn>
+                              </p:par>
+                            </p:childTnLst>
+                          </p:cTn>
+                        </p:par>
+                      </p:childTnLst>
+                    </p:cTn>
+                  </p:par>
+                  <p:par>
+                    <p:cTn id="23" fill="hold">
+                      <p:stCondLst>
+                        <p:cond delay="indefinite"/>
+                      </p:stCondLst>
+                      <p:childTnLst>
+                        <p:par>
+                          <p:cTn id="24" fill="hold">
+                            <p:stCondLst>
+                              <p:cond delay="0"/>
+                            </p:stCondLst>
+                            <p:childTnLst>
+                              <p:par>
+                                <p:cTn id="25" presetID="10" presetClass="entr" presetSubtype="0" fill="hold" grpId="0" nodeType="clickEffect">
+                                  <p:stCondLst>
+                                    <p:cond delay="0"/>
+                                  </p:stCondLst>
+                                  <p:childTnLst>
+                                    <p:set>
+                                      <p:cBhvr>
+                                        <p:cTn id="26" dur="1" fill="hold">
+                                          <p:stCondLst>
+                                            <p:cond delay="0"/>
+                                          </p:stCondLst>
+                                        </p:cTn>
+                                        <p:tgtEl>
+                                          <p:spTgt spid="3">
+                                            <p:txEl>
+                                              <p:pRg st="4" end="4"/>
+                                            </p:txEl>
+                                          </p:spTgt>
+                                        </p:tgtEl>
+                                        <p:attrNameLst>
+                                          <p:attrName>style.visibility</p:attrName>
+                                        </p:attrNameLst>
+                                      </p:cBhvr>
+                                      <p:to>
+                                        <p:strVal val="visible"/>
+                                      </p:to>
+                                    </p:set>
+                                    <p:animEffect transition="in" filter="fade">
+                                      <p:cBhvr>
+                                        <p:cTn id="27" dur="500"/>
+                                        <p:tgtEl>
+                                          <p:spTgt spid="3">
+                                            <p:txEl>
+                                              <p:pRg st="4" end="4"/>
+                                            </p:txEl>
+                                          </p:spTgt>
+                                        </p:tgtEl>
+                                      </p:cBhvr>
+                                    </p:animEffect>
+                                  </p:childTnLst>
+                                </p:cTn>
+                              </p:par>
+                            </p:childTnLst>
+                          </p:cTn>
+                        </p:par>
+                      </p:childTnLst>
+                    </p:cTn>
+                  </p:par>
+                  <p:par>
+                    <p:cTn id="28" fill="hold">
+                      <p:stCondLst>
+                        <p:cond delay="indefinite"/>
+                      </p:stCondLst>
+                      <p:childTnLst>
+                        <p:par>
+                          <p:cTn id="29" fill="hold">
+                            <p:stCondLst>
+                              <p:cond delay="0"/>
+                            </p:stCondLst>
+                            <p:childTnLst>
+                              <p:par>
+                                <p:cTn id="30" presetID="10" presetClass="entr" presetSubtype="0" fill="hold" grpId="0" nodeType="clickEffect">
+                                  <p:stCondLst>
+                                    <p:cond delay="0"/>
+                                  </p:stCondLst>
+                                  <p:childTnLst>
+                                    <p:set>
+                                      <p:cBhvr>
+                                        <p:cTn id="31" dur="1" fill="hold">
+                                          <p:stCondLst>
+                                            <p:cond delay="0"/>
+                                          </p:stCondLst>
+                                        </p:cTn>
+                                        <p:tgtEl>
+                                          <p:spTgt spid="3">
+                                            <p:txEl>
+                                              <p:pRg st="5" end="5"/>
+                                            </p:txEl>
+                                          </p:spTgt>
+                                        </p:tgtEl>
+                                        <p:attrNameLst>
+                                          <p:attrName>style.visibility</p:attrName>
+                                        </p:attrNameLst>
+                                      </p:cBhvr>
+                                      <p:to>
+                                        <p:strVal val="visible"/>
+                                      </p:to>
+                                    </p:set>
+                                    <p:animEffect transition="in" filter="fade">
+                                      <p:cBhvr>
+                                        <p:cTn id="32" dur="500"/>
+                                        <p:tgtEl>
+                                          <p:spTgt spid="3">
+                                            <p:txEl>
+                                              <p:pRg st="5" end="5"/>
+                                            </p:txEl>
+                                          </p:spTgt>
+                                        </p:tgtEl>
+                                      </p:cBhvr>
+                                    </p:animEffect>
+                                  </p:childTnLst>
+                                </p:cTn>
+                              </p:par>
+                            </p:childTnLst>
+                          </p:cTn>
+                        </p:par>
+                      </p:childTnLst>
+                    </p:cTn>
+                  </p:par>
+                  <p:par>
+                    <p:cTn id="33" fill="hold">
+                      <p:stCondLst>
+                        <p:cond delay="indefinite"/>
+                      </p:stCondLst>
+                      <p:childTnLst>
+                        <p:par>
+                          <p:cTn id="34" fill="hold">
+                            <p:stCondLst>
+                              <p:cond delay="0"/>
+                            </p:stCondLst>
+                            <p:childTnLst>
+                              <p:par>
+                                <p:cTn id="35" presetID="10" presetClass="entr" presetSubtype="0" fill="hold" grpId="0" nodeType="clickEffect">
+                                  <p:stCondLst>
+                                    <p:cond delay="0"/>
+                                  </p:stCondLst>
+                                  <p:childTnLst>
+                                    <p:set>
+                                      <p:cBhvr>
+                                        <p:cTn id="36" dur="1" fill="hold">
+                                          <p:stCondLst>
+                                            <p:cond delay="0"/>
+                                          </p:stCondLst>
+                                        </p:cTn>
+                                        <p:tgtEl>
+                                          <p:spTgt spid="3">
+                                            <p:txEl>
+                                              <p:pRg st="6" end="6"/>
+                                            </p:txEl>
+                                          </p:spTgt>
+                                        </p:tgtEl>
+                                        <p:attrNameLst>
+                                          <p:attrName>style.visibility</p:attrName>
+                                        </p:attrNameLst>
+                                      </p:cBhvr>
+                                      <p:to>
+                                        <p:strVal val="visible"/>
+                                      </p:to>
+                                    </p:set>
+                                    <p:animEffect transition="in" filter="fade">
+                                      <p:cBhvr>
+                                        <p:cTn id="37" dur="500"/>
+                                        <p:tgtEl>
+                                          <p:spTgt spid="3">
+                                            <p:txEl>
+                                              <p:pRg st="6" end="6"/>
+                                            </p:txEl>
+                                          </p:spTgt>
+                                        </p:tgtEl>
+                                      </p:cBhvr>
+                                    </p:animEffect>
+                                  </p:childTnLst>
+                                </p:cTn>
+                              </p:par>
+                            </p:childTnLst>
+                          </p:cTn>
+                        </p:par>
+                      </p:childTnLst>
+                    </p:cTn>
+                  </p:par>
+                  <p:par>
+                    <p:cTn id="38" fill="hold">
+                      <p:stCondLst>
+                        <p:cond delay="indefinite"/>
+                      </p:stCondLst>
+                      <p:childTnLst>
+                        <p:par>
+                          <p:cTn id="39" fill="hold">
+                            <p:stCondLst>
+                              <p:cond delay="0"/>
+                            </p:stCondLst>
+                            <p:childTnLst>
+                              <p:par>
+                                <p:cTn id="40" presetID="10" presetClass="entr" presetSubtype="0" fill="hold" grpId="0" nodeType="clickEffect">
+                                  <p:stCondLst>
+                                    <p:cond delay="0"/>
+                                  </p:stCondLst>
+                                  <p:childTnLst>
+                                    <p:set>
+                                      <p:cBhvr>
+                                        <p:cTn id="41" dur="1" fill="hold">
+                                          <p:stCondLst>
+                                            <p:cond delay="0"/>
+                                          </p:stCondLst>
+                                        </p:cTn>
+                                        <p:tgtEl>
+                                          <p:spTgt spid="3">
+                                            <p:txEl>
+                                              <p:pRg st="7" end="7"/>
+                                            </p:txEl>
+                                          </p:spTgt>
+                                        </p:tgtEl>
+                                        <p:attrNameLst>
+                                          <p:attrName>style.visibility</p:attrName>
+                                        </p:attrNameLst>
+                                      </p:cBhvr>
+                                      <p:to>
+                                        <p:strVal val="visible"/>
+                                      </p:to>
+                                    </p:set>
+                                    <p:animEffect transition="in" filter="fade">
+                                      <p:cBhvr>
+                                        <p:cTn id="42" dur="500"/>
+                                        <p:tgtEl>
+                                          <p:spTgt spid="3">
+                                            <p:txEl>
+                                              <p:pRg st="7" end="7"/>
+                                            </p:txEl>
+                                          </p:spTgt>
+                                        </p:tgtEl>
+                                      </p:cBhvr>
+                                    </p:animEffect>
+                                  </p:childTnLst>
+                                </p:cTn>
+                              </p:par>
+                            </p:childTnLst>
+                          </p:cTn>
+                        </p:par>
+                      </p:childTnLst>
+                    </p:cTn>
+                  </p:par>
+                </p:childTnLst>
+              </p:cTn>
+              <p:prevCondLst>
+                <p:cond evt="onPrev" delay="0">
+                  <p:tgtEl>
+                    <p:sldTgt/>
+                  </p:tgtEl>
+                </p:cond>
+              </p:prevCondLst>
+              <p:nextCondLst>
+                <p:cond evt="onNext" delay="0">
+                  <p:tgtEl>
+                    <p:sldTgt/>
+                  </p:tgtEl>
+                </p:cond>
+              </p:nextCondLst>
+            </p:seq>
+          </p:childTnLst>
+        </p:cTn>
+      </p:par>
+    </p:tnLst>
+    <p:bldLst>
+      <p:bldP spid="3" grpId="0" build="p"/>
+    </p:bldLst>
+  </p:timing>
 </p:sld>
 </file>
 

</xml_diff>

<commit_message>
update pptx, EF slide
</commit_message>
<xml_diff>
--- a/ORM.pptx
+++ b/ORM.pptx
@@ -220,7 +220,7 @@
           <a:p>
             <a:fld id="{9F002C11-C09A-4ACE-9D7A-CCD5AA8B4878}" type="datetimeFigureOut">
               <a:rPr lang="en-US" smtClean="0"/>
-              <a:t>2023-07-21</a:t>
+              <a:t>2023-08-03</a:t>
             </a:fld>
             <a:endParaRPr lang="en-US"/>
           </a:p>
@@ -920,7 +920,7 @@
           <a:p>
             <a:fld id="{BF8FF73C-A8CE-4A81-8069-D9219E5A7BF7}" type="datetimeFigureOut">
               <a:rPr lang="en-GB" smtClean="0"/>
-              <a:t>21/07/2023</a:t>
+              <a:t>03/08/2023</a:t>
             </a:fld>
             <a:endParaRPr lang="en-GB"/>
           </a:p>
@@ -1233,7 +1233,7 @@
           <a:p>
             <a:fld id="{BF8FF73C-A8CE-4A81-8069-D9219E5A7BF7}" type="datetimeFigureOut">
               <a:rPr lang="en-GB" smtClean="0"/>
-              <a:t>21/07/2023</a:t>
+              <a:t>03/08/2023</a:t>
             </a:fld>
             <a:endParaRPr lang="en-GB"/>
           </a:p>
@@ -1522,7 +1522,7 @@
           <a:p>
             <a:fld id="{BF8FF73C-A8CE-4A81-8069-D9219E5A7BF7}" type="datetimeFigureOut">
               <a:rPr lang="en-GB" smtClean="0"/>
-              <a:t>21/07/2023</a:t>
+              <a:t>03/08/2023</a:t>
             </a:fld>
             <a:endParaRPr lang="en-GB"/>
           </a:p>
@@ -1722,7 +1722,7 @@
           <a:p>
             <a:fld id="{BF8FF73C-A8CE-4A81-8069-D9219E5A7BF7}" type="datetimeFigureOut">
               <a:rPr lang="en-GB" smtClean="0"/>
-              <a:t>21/07/2023</a:t>
+              <a:t>03/08/2023</a:t>
             </a:fld>
             <a:endParaRPr lang="en-GB"/>
           </a:p>
@@ -1932,7 +1932,7 @@
           <a:p>
             <a:fld id="{BF8FF73C-A8CE-4A81-8069-D9219E5A7BF7}" type="datetimeFigureOut">
               <a:rPr lang="en-GB" smtClean="0"/>
-              <a:t>21/07/2023</a:t>
+              <a:t>03/08/2023</a:t>
             </a:fld>
             <a:endParaRPr lang="en-GB"/>
           </a:p>
@@ -2591,7 +2591,7 @@
           <a:p>
             <a:fld id="{BF8FF73C-A8CE-4A81-8069-D9219E5A7BF7}" type="datetimeFigureOut">
               <a:rPr lang="en-GB" smtClean="0"/>
-              <a:t>21/07/2023</a:t>
+              <a:t>03/08/2023</a:t>
             </a:fld>
             <a:endParaRPr lang="en-GB"/>
           </a:p>
@@ -2791,7 +2791,7 @@
           <a:p>
             <a:fld id="{BF8FF73C-A8CE-4A81-8069-D9219E5A7BF7}" type="datetimeFigureOut">
               <a:rPr lang="en-GB" smtClean="0"/>
-              <a:t>21/07/2023</a:t>
+              <a:t>03/08/2023</a:t>
             </a:fld>
             <a:endParaRPr lang="en-GB"/>
           </a:p>
@@ -3067,7 +3067,7 @@
           <a:p>
             <a:fld id="{BF8FF73C-A8CE-4A81-8069-D9219E5A7BF7}" type="datetimeFigureOut">
               <a:rPr lang="en-GB" smtClean="0"/>
-              <a:t>21/07/2023</a:t>
+              <a:t>03/08/2023</a:t>
             </a:fld>
             <a:endParaRPr lang="en-GB"/>
           </a:p>
@@ -3335,7 +3335,7 @@
           <a:p>
             <a:fld id="{BF8FF73C-A8CE-4A81-8069-D9219E5A7BF7}" type="datetimeFigureOut">
               <a:rPr lang="en-GB" smtClean="0"/>
-              <a:t>21/07/2023</a:t>
+              <a:t>03/08/2023</a:t>
             </a:fld>
             <a:endParaRPr lang="en-GB"/>
           </a:p>
@@ -3750,7 +3750,7 @@
           <a:p>
             <a:fld id="{BF8FF73C-A8CE-4A81-8069-D9219E5A7BF7}" type="datetimeFigureOut">
               <a:rPr lang="en-GB" smtClean="0"/>
-              <a:t>21/07/2023</a:t>
+              <a:t>03/08/2023</a:t>
             </a:fld>
             <a:endParaRPr lang="en-GB"/>
           </a:p>
@@ -3892,7 +3892,7 @@
           <a:p>
             <a:fld id="{BF8FF73C-A8CE-4A81-8069-D9219E5A7BF7}" type="datetimeFigureOut">
               <a:rPr lang="en-GB" smtClean="0"/>
-              <a:t>21/07/2023</a:t>
+              <a:t>03/08/2023</a:t>
             </a:fld>
             <a:endParaRPr lang="en-GB"/>
           </a:p>
@@ -4133,7 +4133,7 @@
           <a:p>
             <a:fld id="{C12C188B-3DDD-4AB5-80E3-A20B86A22CA2}" type="datetimeFigureOut">
               <a:rPr lang="en-US" smtClean="0"/>
-              <a:t>2023-07-21</a:t>
+              <a:t>2023-08-03</a:t>
             </a:fld>
             <a:endParaRPr lang="en-US"/>
           </a:p>
@@ -4792,7 +4792,7 @@
           <a:p>
             <a:fld id="{BF8FF73C-A8CE-4A81-8069-D9219E5A7BF7}" type="datetimeFigureOut">
               <a:rPr lang="en-GB" smtClean="0"/>
-              <a:t>21/07/2023</a:t>
+              <a:t>03/08/2023</a:t>
             </a:fld>
             <a:endParaRPr lang="en-GB"/>
           </a:p>
@@ -11576,8 +11576,8 @@
         </p:nvSpPr>
         <p:spPr>
           <a:xfrm>
-            <a:off x="4474387" y="3761009"/>
-            <a:ext cx="2801566" cy="2722762"/>
+            <a:off x="177595" y="1920464"/>
+            <a:ext cx="2823058" cy="3317361"/>
           </a:xfrm>
           <a:prstGeom prst="can">
             <a:avLst/>
@@ -11619,7 +11619,7 @@
               <a:tabLst/>
               <a:defRPr/>
             </a:pPr>
-            <a:endParaRPr kumimoji="0" lang="en-GB" sz="1800" b="0" i="0" u="none" strike="noStrike" kern="1200" cap="none" spc="0" normalizeH="0" baseline="0" noProof="0">
+            <a:endParaRPr kumimoji="0" lang="en-GB" sz="1800" b="0" i="0" u="none" strike="noStrike" kern="1200" cap="none" spc="0" normalizeH="0" baseline="0" noProof="0" dirty="0">
               <a:ln>
                 <a:noFill/>
               </a:ln>
@@ -11664,8 +11664,8 @@
         </p:blipFill>
         <p:spPr>
           <a:xfrm>
-            <a:off x="4896489" y="4643227"/>
-            <a:ext cx="2063151" cy="1498027"/>
+            <a:off x="486304" y="2900339"/>
+            <a:ext cx="2214513" cy="1607929"/>
           </a:xfrm>
           <a:prstGeom prst="rect">
             <a:avLst/>
@@ -11714,12 +11714,28 @@
         </p:blipFill>
         <p:spPr>
           <a:xfrm>
-            <a:off x="4514036" y="258549"/>
-            <a:ext cx="2761917" cy="1280126"/>
+            <a:off x="8100395" y="2757477"/>
+            <a:ext cx="2761917" cy="1762583"/>
           </a:xfrm>
-          <a:prstGeom prst="rect">
-            <a:avLst/>
+          <a:prstGeom prst="round2DiagRect">
+            <a:avLst>
+              <a:gd name="adj1" fmla="val 16667"/>
+              <a:gd name="adj2" fmla="val 0"/>
+            </a:avLst>
           </a:prstGeom>
+          <a:ln w="88900" cap="sq">
+            <a:solidFill>
+              <a:srgbClr val="FFFFFF"/>
+            </a:solidFill>
+            <a:miter lim="800000"/>
+          </a:ln>
+          <a:effectLst>
+            <a:outerShdw blurRad="254000" algn="tl" rotWithShape="0">
+              <a:srgbClr val="000000">
+                <a:alpha val="43000"/>
+              </a:srgbClr>
+            </a:outerShdw>
+          </a:effectLst>
         </p:spPr>
         <p:style>
           <a:lnRef idx="0">
@@ -11736,12 +11752,54 @@
           </a:fontRef>
         </p:style>
       </p:pic>
+      <p:pic>
+        <p:nvPicPr>
+          <p:cNvPr id="3" name="Picture 2">
+            <a:extLst>
+              <a:ext uri="{FF2B5EF4-FFF2-40B4-BE49-F238E27FC236}">
+                <a16:creationId xmlns:a16="http://schemas.microsoft.com/office/drawing/2014/main" id="{8CD91C1A-A1D9-C113-F774-13F569DF45B6}"/>
+              </a:ext>
+            </a:extLst>
+          </p:cNvPr>
+          <p:cNvPicPr>
+            <a:picLocks noChangeAspect="1"/>
+          </p:cNvPicPr>
+          <p:nvPr/>
+        </p:nvPicPr>
+        <p:blipFill>
+          <a:blip r:embed="rId4">
+            <a:extLst>
+              <a:ext uri="{28A0092B-C50C-407E-A947-70E740481C1C}">
+                <a14:useLocalDpi xmlns:a14="http://schemas.microsoft.com/office/drawing/2010/main" val="0"/>
+              </a:ext>
+            </a:extLst>
+          </a:blip>
+          <a:stretch>
+            <a:fillRect/>
+          </a:stretch>
+        </p:blipFill>
+        <p:spPr>
+          <a:xfrm>
+            <a:off x="3092861" y="2694568"/>
+            <a:ext cx="4915326" cy="2019475"/>
+          </a:xfrm>
+          <a:prstGeom prst="rect">
+            <a:avLst/>
+          </a:prstGeom>
+          <a:ln>
+            <a:noFill/>
+          </a:ln>
+          <a:effectLst>
+            <a:softEdge rad="112500"/>
+          </a:effectLst>
+        </p:spPr>
+      </p:pic>
       <p:sp>
         <p:nvSpPr>
-          <p:cNvPr id="20" name="Arrow: Down 19">
-            <a:extLst>
-              <a:ext uri="{FF2B5EF4-FFF2-40B4-BE49-F238E27FC236}">
-                <a16:creationId xmlns:a16="http://schemas.microsoft.com/office/drawing/2014/main" id="{F685F2CC-0D87-7666-1769-54BB54535BD0}"/>
+          <p:cNvPr id="5" name="Rectangle: Diagonal Corners Rounded 4">
+            <a:extLst>
+              <a:ext uri="{FF2B5EF4-FFF2-40B4-BE49-F238E27FC236}">
+                <a16:creationId xmlns:a16="http://schemas.microsoft.com/office/drawing/2014/main" id="{775A7E4A-28BC-1641-BBDF-FB35FC6D73A5}"/>
               </a:ext>
             </a:extLst>
           </p:cNvPr>
@@ -11750,221 +11808,190 @@
         </p:nvSpPr>
         <p:spPr>
           <a:xfrm>
-            <a:off x="5735740" y="3096991"/>
-            <a:ext cx="278860" cy="995397"/>
+            <a:off x="5004046" y="1920464"/>
+            <a:ext cx="2195744" cy="3317362"/>
           </a:xfrm>
-          <a:prstGeom prst="downArrow">
-            <a:avLst/>
+          <a:prstGeom prst="round2DiagRect">
+            <a:avLst>
+              <a:gd name="adj1" fmla="val 16667"/>
+              <a:gd name="adj2" fmla="val 425"/>
+            </a:avLst>
           </a:prstGeom>
-          <a:ln/>
+          <a:noFill/>
+          <a:ln w="9525" cap="flat" cmpd="sng" algn="ctr">
+            <a:solidFill>
+              <a:schemeClr val="accent4"/>
+            </a:solidFill>
+            <a:prstDash val="solid"/>
+            <a:round/>
+            <a:headEnd type="none" w="med" len="med"/>
+            <a:tailEnd type="none" w="med" len="med"/>
+          </a:ln>
         </p:spPr>
         <p:style>
           <a:lnRef idx="0">
-            <a:schemeClr val="accent2"/>
+            <a:scrgbClr r="0" g="0" b="0"/>
           </a:lnRef>
-          <a:fillRef idx="3">
-            <a:schemeClr val="accent2"/>
+          <a:fillRef idx="0">
+            <a:scrgbClr r="0" g="0" b="0"/>
           </a:fillRef>
-          <a:effectRef idx="3">
-            <a:schemeClr val="accent2"/>
+          <a:effectRef idx="0">
+            <a:scrgbClr r="0" g="0" b="0"/>
           </a:effectRef>
           <a:fontRef idx="minor">
-            <a:schemeClr val="lt1"/>
+            <a:schemeClr val="accent4"/>
           </a:fontRef>
         </p:style>
         <p:txBody>
           <a:bodyPr rtlCol="0" anchor="ctr"/>
           <a:lstStyle/>
           <a:p>
-            <a:pPr marL="0" marR="0" lvl="0" indent="0" algn="ctr" defTabSz="914400" rtl="0" eaLnBrk="1" fontAlgn="auto" latinLnBrk="0" hangingPunct="1">
-              <a:lnSpc>
-                <a:spcPct val="100000"/>
-              </a:lnSpc>
-              <a:spcBef>
-                <a:spcPts val="0"/>
-              </a:spcBef>
-              <a:spcAft>
-                <a:spcPts val="0"/>
-              </a:spcAft>
-              <a:buClrTx/>
-              <a:buSzTx/>
-              <a:buFontTx/>
-              <a:buNone/>
-              <a:tabLst/>
-              <a:defRPr/>
-            </a:pPr>
-            <a:endParaRPr kumimoji="0" lang="en-GB" sz="1800" b="0" i="0" u="none" strike="noStrike" kern="1200" cap="none" spc="0" normalizeH="0" baseline="0" noProof="0">
-              <a:ln>
-                <a:noFill/>
-              </a:ln>
-              <a:solidFill>
-                <a:prstClr val="white"/>
-              </a:solidFill>
-              <a:effectLst/>
-              <a:uLnTx/>
-              <a:uFillTx/>
-              <a:latin typeface="Calibri" panose="020F0502020204030204"/>
-              <a:ea typeface="+mn-ea"/>
-              <a:cs typeface="+mn-cs"/>
-            </a:endParaRPr>
+            <a:pPr algn="ctr"/>
+            <a:endParaRPr lang="en-GB"/>
+          </a:p>
+        </p:txBody>
+      </p:sp>
+      <p:cxnSp>
+        <p:nvCxnSpPr>
+          <p:cNvPr id="7" name="Straight Connector 6">
+            <a:extLst>
+              <a:ext uri="{FF2B5EF4-FFF2-40B4-BE49-F238E27FC236}">
+                <a16:creationId xmlns:a16="http://schemas.microsoft.com/office/drawing/2014/main" id="{22D787FB-FAD9-5586-2978-32CF66EEA304}"/>
+              </a:ext>
+            </a:extLst>
+          </p:cNvPr>
+          <p:cNvCxnSpPr/>
+          <p:nvPr/>
+        </p:nvCxnSpPr>
+        <p:spPr>
+          <a:xfrm>
+            <a:off x="62144" y="1553592"/>
+            <a:ext cx="11620870" cy="0"/>
+          </a:xfrm>
+          <a:prstGeom prst="line">
+            <a:avLst/>
+          </a:prstGeom>
+        </p:spPr>
+        <p:style>
+          <a:lnRef idx="1">
+            <a:schemeClr val="accent1"/>
+          </a:lnRef>
+          <a:fillRef idx="0">
+            <a:schemeClr val="accent1"/>
+          </a:fillRef>
+          <a:effectRef idx="0">
+            <a:schemeClr val="accent1"/>
+          </a:effectRef>
+          <a:fontRef idx="minor">
+            <a:schemeClr val="tx1"/>
+          </a:fontRef>
+        </p:style>
+      </p:cxnSp>
+      <p:sp>
+        <p:nvSpPr>
+          <p:cNvPr id="8" name="TextBox 7">
+            <a:extLst>
+              <a:ext uri="{FF2B5EF4-FFF2-40B4-BE49-F238E27FC236}">
+                <a16:creationId xmlns:a16="http://schemas.microsoft.com/office/drawing/2014/main" id="{9116532C-BD21-B4DF-3AA2-1BB8FF5CA6AF}"/>
+              </a:ext>
+            </a:extLst>
+          </p:cNvPr>
+          <p:cNvSpPr txBox="1"/>
+          <p:nvPr/>
+        </p:nvSpPr>
+        <p:spPr>
+          <a:xfrm>
+            <a:off x="486304" y="1028246"/>
+            <a:ext cx="2328557" cy="461665"/>
+          </a:xfrm>
+          <a:prstGeom prst="rect">
+            <a:avLst/>
+          </a:prstGeom>
+          <a:noFill/>
+        </p:spPr>
+        <p:txBody>
+          <a:bodyPr wrap="square" rtlCol="0">
+            <a:spAutoFit/>
+          </a:bodyPr>
+          <a:lstStyle/>
+          <a:p>
+            <a:r>
+              <a:rPr lang="en-US" sz="2400" dirty="0"/>
+              <a:t>Database Layer</a:t>
+            </a:r>
+            <a:endParaRPr lang="en-GB" sz="2400" dirty="0"/>
           </a:p>
         </p:txBody>
       </p:sp>
       <p:sp>
         <p:nvSpPr>
-          <p:cNvPr id="21" name="Arrow: Up-Down 20">
-            <a:extLst>
-              <a:ext uri="{FF2B5EF4-FFF2-40B4-BE49-F238E27FC236}">
-                <a16:creationId xmlns:a16="http://schemas.microsoft.com/office/drawing/2014/main" id="{FC50720D-9AFE-1DCD-4FDC-01CE675EE26F}"/>
-              </a:ext>
-            </a:extLst>
-          </p:cNvPr>
-          <p:cNvSpPr/>
+          <p:cNvPr id="9" name="TextBox 8">
+            <a:extLst>
+              <a:ext uri="{FF2B5EF4-FFF2-40B4-BE49-F238E27FC236}">
+                <a16:creationId xmlns:a16="http://schemas.microsoft.com/office/drawing/2014/main" id="{B8DE68DE-DDC9-6F9F-F781-BD71299E814F}"/>
+              </a:ext>
+            </a:extLst>
+          </p:cNvPr>
+          <p:cNvSpPr txBox="1"/>
           <p:nvPr/>
         </p:nvSpPr>
         <p:spPr>
           <a:xfrm>
-            <a:off x="5776473" y="1569251"/>
-            <a:ext cx="225965" cy="724421"/>
+            <a:off x="5004046" y="1028246"/>
+            <a:ext cx="2391296" cy="461665"/>
           </a:xfrm>
-          <a:prstGeom prst="upDownArrow">
+          <a:prstGeom prst="rect">
             <a:avLst/>
           </a:prstGeom>
-          <a:ln/>
+          <a:noFill/>
         </p:spPr>
-        <p:style>
-          <a:lnRef idx="0">
-            <a:schemeClr val="accent2"/>
-          </a:lnRef>
-          <a:fillRef idx="3">
-            <a:schemeClr val="accent2"/>
-          </a:fillRef>
-          <a:effectRef idx="3">
-            <a:schemeClr val="accent2"/>
-          </a:effectRef>
-          <a:fontRef idx="minor">
-            <a:schemeClr val="lt1"/>
-          </a:fontRef>
-        </p:style>
         <p:txBody>
-          <a:bodyPr rtlCol="0" anchor="ctr"/>
+          <a:bodyPr wrap="none" rtlCol="0">
+            <a:spAutoFit/>
+          </a:bodyPr>
           <a:lstStyle/>
           <a:p>
-            <a:pPr marL="0" marR="0" lvl="0" indent="0" algn="ctr" defTabSz="914400" rtl="0" eaLnBrk="1" fontAlgn="auto" latinLnBrk="0" hangingPunct="1">
-              <a:lnSpc>
-                <a:spcPct val="100000"/>
-              </a:lnSpc>
-              <a:spcBef>
-                <a:spcPts val="0"/>
-              </a:spcBef>
-              <a:spcAft>
-                <a:spcPts val="0"/>
-              </a:spcAft>
-              <a:buClrTx/>
-              <a:buSzTx/>
-              <a:buFontTx/>
-              <a:buNone/>
-              <a:tabLst/>
-              <a:defRPr/>
-            </a:pPr>
-            <a:endParaRPr kumimoji="0" lang="en-GB" sz="1800" b="0" i="0" u="none" strike="noStrike" kern="1200" cap="none" spc="0" normalizeH="0" baseline="0" noProof="0">
-              <a:ln>
-                <a:noFill/>
-              </a:ln>
-              <a:solidFill>
-                <a:prstClr val="white"/>
-              </a:solidFill>
-              <a:effectLst/>
-              <a:uLnTx/>
-              <a:uFillTx/>
-              <a:latin typeface="Calibri" panose="020F0502020204030204"/>
-              <a:ea typeface="+mn-ea"/>
-              <a:cs typeface="+mn-cs"/>
-            </a:endParaRPr>
+            <a:r>
+              <a:rPr lang="en-US" sz="2400" dirty="0"/>
+              <a:t>Entity Framework</a:t>
+            </a:r>
+            <a:endParaRPr lang="en-GB" sz="2400" dirty="0"/>
           </a:p>
         </p:txBody>
       </p:sp>
       <p:sp>
         <p:nvSpPr>
-          <p:cNvPr id="24" name="Rectangle: Diagonal Corners Rounded 23">
-            <a:extLst>
-              <a:ext uri="{FF2B5EF4-FFF2-40B4-BE49-F238E27FC236}">
-                <a16:creationId xmlns:a16="http://schemas.microsoft.com/office/drawing/2014/main" id="{517AAEF9-D288-32D9-924A-69A4C8580F66}"/>
-              </a:ext>
-            </a:extLst>
-          </p:cNvPr>
-          <p:cNvSpPr/>
+          <p:cNvPr id="10" name="TextBox 9">
+            <a:extLst>
+              <a:ext uri="{FF2B5EF4-FFF2-40B4-BE49-F238E27FC236}">
+                <a16:creationId xmlns:a16="http://schemas.microsoft.com/office/drawing/2014/main" id="{D3E239CE-A672-E7FB-4C54-5F86DDD58D06}"/>
+              </a:ext>
+            </a:extLst>
+          </p:cNvPr>
+          <p:cNvSpPr txBox="1"/>
           <p:nvPr/>
         </p:nvSpPr>
         <p:spPr>
-          <a:xfrm rot="10800000">
-            <a:off x="3443644" y="2154805"/>
-            <a:ext cx="4863052" cy="1081053"/>
+          <a:xfrm>
+            <a:off x="7901127" y="1027704"/>
+            <a:ext cx="3187084" cy="461665"/>
           </a:xfrm>
-          <a:prstGeom prst="round2DiagRect">
-            <a:avLst>
-              <a:gd name="adj1" fmla="val 2905"/>
-              <a:gd name="adj2" fmla="val 0"/>
-            </a:avLst>
+          <a:prstGeom prst="rect">
+            <a:avLst/>
           </a:prstGeom>
-          <a:ln/>
-          <a:scene3d>
-            <a:camera prst="isometricOffAxis2Top"/>
-            <a:lightRig rig="threePt" dir="t"/>
-          </a:scene3d>
-          <a:sp3d>
-            <a:bevelT w="165100" prst="coolSlant"/>
-          </a:sp3d>
+          <a:noFill/>
         </p:spPr>
-        <p:style>
-          <a:lnRef idx="0">
-            <a:schemeClr val="accent3"/>
-          </a:lnRef>
-          <a:fillRef idx="3">
-            <a:schemeClr val="accent3"/>
-          </a:fillRef>
-          <a:effectRef idx="3">
-            <a:schemeClr val="accent3"/>
-          </a:effectRef>
-          <a:fontRef idx="minor">
-            <a:schemeClr val="lt1"/>
-          </a:fontRef>
-        </p:style>
         <p:txBody>
-          <a:bodyPr rtlCol="0" anchor="ctr"/>
+          <a:bodyPr wrap="square" rtlCol="0">
+            <a:spAutoFit/>
+          </a:bodyPr>
           <a:lstStyle/>
           <a:p>
-            <a:pPr marL="0" marR="0" lvl="0" indent="0" algn="ctr" defTabSz="914400" eaLnBrk="1" fontAlgn="auto" latinLnBrk="0" hangingPunct="1">
-              <a:lnSpc>
-                <a:spcPct val="100000"/>
-              </a:lnSpc>
-              <a:spcBef>
-                <a:spcPts val="0"/>
-              </a:spcBef>
-              <a:spcAft>
-                <a:spcPts val="0"/>
-              </a:spcAft>
-              <a:buClrTx/>
-              <a:buSzTx/>
-              <a:buFontTx/>
-              <a:buNone/>
-              <a:tabLst/>
-              <a:defRPr/>
-            </a:pPr>
-            <a:endParaRPr kumimoji="0" lang="en-GB" sz="1800" b="0" i="0" u="none" strike="noStrike" kern="0" cap="none" spc="0" normalizeH="0" baseline="0" noProof="0">
-              <a:ln>
-                <a:noFill/>
-              </a:ln>
-              <a:solidFill>
-                <a:prstClr val="white"/>
-              </a:solidFill>
-              <a:effectLst/>
-              <a:uLnTx/>
-              <a:uFillTx/>
-              <a:latin typeface="Calibri" panose="020F0502020204030204"/>
-              <a:ea typeface="+mn-ea"/>
-              <a:cs typeface="+mn-cs"/>
-            </a:endParaRPr>
+            <a:r>
+              <a:rPr lang="en-US" sz="2400" dirty="0"/>
+              <a:t>Rest of the application</a:t>
+            </a:r>
+            <a:endParaRPr lang="en-GB" sz="2400" dirty="0"/>
           </a:p>
         </p:txBody>
       </p:sp>

</xml_diff>